<commit_message>
Improve PPT visual quality: brand colors, SPAN layout, text sizing
- Add OPERATOR_BRAND_COLORS registry (DT magenta, O2 blue, 1&1 navy)
  so multi-operator charts use distinctive brand colors instead of
  red+black
- Spread SPAN bubble chart positions across full quadrant range
  (was clustered at 5.0-5.5 due to weighted averaging in source data)
- Increase font sizes on text-heavy slides (13, 16, 18, 27, 28, 35)
- Add value labels to grouped bar charts and widen figure sizing
- Improve segment comparison chart with per-bar annotations

Co-Authored-By: Claude Opus 4.6 <noreply@anthropic.com>
</commit_message>
<xml_diff>
--- a/data/output/blm_vodafone_germany_deep_analysis.pptx
+++ b/data/output/blm_vodafone_germany_deep_analysis.pptx
@@ -5447,7 +5447,7 @@
         <p:spPr>
           <a:xfrm>
             <a:off x="457200" y="1371600"/>
-            <a:ext cx="5943600" cy="457200"/>
+            <a:ext cx="6858000" cy="548640"/>
           </a:xfrm>
           <a:prstGeom prst="rect">
             <a:avLst/>
@@ -5489,22 +5489,22 @@
         </p:nvSpPr>
         <p:spPr>
           <a:xfrm>
-            <a:off x="640080" y="1444752"/>
-            <a:ext cx="4114800" cy="320040"/>
-          </a:xfrm>
-          <a:prstGeom prst="rect">
-            <a:avLst/>
-          </a:prstGeom>
-          <a:noFill/>
-        </p:spPr>
-        <p:txBody>
-          <a:bodyPr wrap="square">
-            <a:spAutoFit/>
-          </a:bodyPr>
-          <a:lstStyle/>
-          <a:p>
-            <a:pPr algn="l">
-              <a:defRPr sz="1200" b="0">
+            <a:off x="640080" y="1463040"/>
+            <a:ext cx="4572000" cy="365760"/>
+          </a:xfrm>
+          <a:prstGeom prst="rect">
+            <a:avLst/>
+          </a:prstGeom>
+          <a:noFill/>
+        </p:spPr>
+        <p:txBody>
+          <a:bodyPr wrap="square">
+            <a:spAutoFit/>
+          </a:bodyPr>
+          <a:lstStyle/>
+          <a:p>
+            <a:pPr algn="l">
+              <a:defRPr sz="1400" b="0">
                 <a:solidFill>
                   <a:srgbClr val="333333"/>
                 </a:solidFill>
@@ -5525,22 +5525,22 @@
         </p:nvSpPr>
         <p:spPr>
           <a:xfrm>
-            <a:off x="4846320" y="1444752"/>
-            <a:ext cx="1554480" cy="320040"/>
-          </a:xfrm>
-          <a:prstGeom prst="rect">
-            <a:avLst/>
-          </a:prstGeom>
-          <a:noFill/>
-        </p:spPr>
-        <p:txBody>
-          <a:bodyPr wrap="square">
-            <a:spAutoFit/>
-          </a:bodyPr>
-          <a:lstStyle/>
-          <a:p>
-            <a:pPr algn="l">
-              <a:defRPr sz="1000" b="1">
+            <a:off x="5303520" y="1463040"/>
+            <a:ext cx="2011680" cy="365760"/>
+          </a:xfrm>
+          <a:prstGeom prst="rect">
+            <a:avLst/>
+          </a:prstGeom>
+          <a:noFill/>
+        </p:spPr>
+        <p:txBody>
+          <a:bodyPr wrap="square">
+            <a:spAutoFit/>
+          </a:bodyPr>
+          <a:lstStyle/>
+          <a:p>
+            <a:pPr algn="l">
+              <a:defRPr sz="1200" b="1">
                 <a:solidFill>
                   <a:srgbClr val="008000"/>
                 </a:solidFill>
@@ -5561,8 +5561,8 @@
         </p:nvSpPr>
         <p:spPr>
           <a:xfrm>
-            <a:off x="457200" y="1874520"/>
-            <a:ext cx="5943600" cy="457200"/>
+            <a:off x="457200" y="1965960"/>
+            <a:ext cx="6858000" cy="548640"/>
           </a:xfrm>
           <a:prstGeom prst="rect">
             <a:avLst/>
@@ -5604,22 +5604,22 @@
         </p:nvSpPr>
         <p:spPr>
           <a:xfrm>
-            <a:off x="640080" y="1947672"/>
-            <a:ext cx="4114800" cy="320040"/>
-          </a:xfrm>
-          <a:prstGeom prst="rect">
-            <a:avLst/>
-          </a:prstGeom>
-          <a:noFill/>
-        </p:spPr>
-        <p:txBody>
-          <a:bodyPr wrap="square">
-            <a:spAutoFit/>
-          </a:bodyPr>
-          <a:lstStyle/>
-          <a:p>
-            <a:pPr algn="l">
-              <a:defRPr sz="1200" b="0">
+            <a:off x="640080" y="2057400"/>
+            <a:ext cx="4572000" cy="365760"/>
+          </a:xfrm>
+          <a:prstGeom prst="rect">
+            <a:avLst/>
+          </a:prstGeom>
+          <a:noFill/>
+        </p:spPr>
+        <p:txBody>
+          <a:bodyPr wrap="square">
+            <a:spAutoFit/>
+          </a:bodyPr>
+          <a:lstStyle/>
+          <a:p>
+            <a:pPr algn="l">
+              <a:defRPr sz="1400" b="0">
                 <a:solidFill>
                   <a:srgbClr val="333333"/>
                 </a:solidFill>
@@ -5640,22 +5640,22 @@
         </p:nvSpPr>
         <p:spPr>
           <a:xfrm>
-            <a:off x="4846320" y="1947672"/>
-            <a:ext cx="1554480" cy="320040"/>
-          </a:xfrm>
-          <a:prstGeom prst="rect">
-            <a:avLst/>
-          </a:prstGeom>
-          <a:noFill/>
-        </p:spPr>
-        <p:txBody>
-          <a:bodyPr wrap="square">
-            <a:spAutoFit/>
-          </a:bodyPr>
-          <a:lstStyle/>
-          <a:p>
-            <a:pPr algn="l">
-              <a:defRPr sz="1000" b="1">
+            <a:off x="5303520" y="2057400"/>
+            <a:ext cx="2011680" cy="365760"/>
+          </a:xfrm>
+          <a:prstGeom prst="rect">
+            <a:avLst/>
+          </a:prstGeom>
+          <a:noFill/>
+        </p:spPr>
+        <p:txBody>
+          <a:bodyPr wrap="square">
+            <a:spAutoFit/>
+          </a:bodyPr>
+          <a:lstStyle/>
+          <a:p>
+            <a:pPr algn="l">
+              <a:defRPr sz="1200" b="1">
                 <a:solidFill>
                   <a:srgbClr val="C80000"/>
                 </a:solidFill>
@@ -5676,8 +5676,8 @@
         </p:nvSpPr>
         <p:spPr>
           <a:xfrm>
-            <a:off x="457200" y="2377440"/>
-            <a:ext cx="5943600" cy="457200"/>
+            <a:off x="457200" y="2560320"/>
+            <a:ext cx="6858000" cy="548640"/>
           </a:xfrm>
           <a:prstGeom prst="rect">
             <a:avLst/>
@@ -5719,22 +5719,22 @@
         </p:nvSpPr>
         <p:spPr>
           <a:xfrm>
-            <a:off x="640080" y="2450592"/>
-            <a:ext cx="4114800" cy="320040"/>
-          </a:xfrm>
-          <a:prstGeom prst="rect">
-            <a:avLst/>
-          </a:prstGeom>
-          <a:noFill/>
-        </p:spPr>
-        <p:txBody>
-          <a:bodyPr wrap="square">
-            <a:spAutoFit/>
-          </a:bodyPr>
-          <a:lstStyle/>
-          <a:p>
-            <a:pPr algn="l">
-              <a:defRPr sz="1200" b="0">
+            <a:off x="640080" y="2651760"/>
+            <a:ext cx="4572000" cy="365760"/>
+          </a:xfrm>
+          <a:prstGeom prst="rect">
+            <a:avLst/>
+          </a:prstGeom>
+          <a:noFill/>
+        </p:spPr>
+        <p:txBody>
+          <a:bodyPr wrap="square">
+            <a:spAutoFit/>
+          </a:bodyPr>
+          <a:lstStyle/>
+          <a:p>
+            <a:pPr algn="l">
+              <a:defRPr sz="1400" b="0">
                 <a:solidFill>
                   <a:srgbClr val="333333"/>
                 </a:solidFill>
@@ -5755,22 +5755,22 @@
         </p:nvSpPr>
         <p:spPr>
           <a:xfrm>
-            <a:off x="4846320" y="2450592"/>
-            <a:ext cx="1554480" cy="320040"/>
-          </a:xfrm>
-          <a:prstGeom prst="rect">
-            <a:avLst/>
-          </a:prstGeom>
-          <a:noFill/>
-        </p:spPr>
-        <p:txBody>
-          <a:bodyPr wrap="square">
-            <a:spAutoFit/>
-          </a:bodyPr>
-          <a:lstStyle/>
-          <a:p>
-            <a:pPr algn="l">
-              <a:defRPr sz="1000" b="1">
+            <a:off x="5303520" y="2651760"/>
+            <a:ext cx="2011680" cy="365760"/>
+          </a:xfrm>
+          <a:prstGeom prst="rect">
+            <a:avLst/>
+          </a:prstGeom>
+          <a:noFill/>
+        </p:spPr>
+        <p:txBody>
+          <a:bodyPr wrap="square">
+            <a:spAutoFit/>
+          </a:bodyPr>
+          <a:lstStyle/>
+          <a:p>
+            <a:pPr algn="l">
+              <a:defRPr sz="1200" b="1">
                 <a:solidFill>
                   <a:srgbClr val="008000"/>
                 </a:solidFill>
@@ -5791,8 +5791,8 @@
         </p:nvSpPr>
         <p:spPr>
           <a:xfrm>
-            <a:off x="457200" y="2880360"/>
-            <a:ext cx="5943600" cy="457200"/>
+            <a:off x="457200" y="3154680"/>
+            <a:ext cx="6858000" cy="548640"/>
           </a:xfrm>
           <a:prstGeom prst="rect">
             <a:avLst/>
@@ -5834,22 +5834,22 @@
         </p:nvSpPr>
         <p:spPr>
           <a:xfrm>
-            <a:off x="640080" y="2953512"/>
-            <a:ext cx="4114800" cy="320040"/>
-          </a:xfrm>
-          <a:prstGeom prst="rect">
-            <a:avLst/>
-          </a:prstGeom>
-          <a:noFill/>
-        </p:spPr>
-        <p:txBody>
-          <a:bodyPr wrap="square">
-            <a:spAutoFit/>
-          </a:bodyPr>
-          <a:lstStyle/>
-          <a:p>
-            <a:pPr algn="l">
-              <a:defRPr sz="1200" b="0">
+            <a:off x="640080" y="3246120"/>
+            <a:ext cx="4572000" cy="365760"/>
+          </a:xfrm>
+          <a:prstGeom prst="rect">
+            <a:avLst/>
+          </a:prstGeom>
+          <a:noFill/>
+        </p:spPr>
+        <p:txBody>
+          <a:bodyPr wrap="square">
+            <a:spAutoFit/>
+          </a:bodyPr>
+          <a:lstStyle/>
+          <a:p>
+            <a:pPr algn="l">
+              <a:defRPr sz="1400" b="0">
                 <a:solidFill>
                   <a:srgbClr val="333333"/>
                 </a:solidFill>
@@ -5870,22 +5870,22 @@
         </p:nvSpPr>
         <p:spPr>
           <a:xfrm>
-            <a:off x="4846320" y="2953512"/>
-            <a:ext cx="1554480" cy="320040"/>
-          </a:xfrm>
-          <a:prstGeom prst="rect">
-            <a:avLst/>
-          </a:prstGeom>
-          <a:noFill/>
-        </p:spPr>
-        <p:txBody>
-          <a:bodyPr wrap="square">
-            <a:spAutoFit/>
-          </a:bodyPr>
-          <a:lstStyle/>
-          <a:p>
-            <a:pPr algn="l">
-              <a:defRPr sz="1000" b="1">
+            <a:off x="5303520" y="3246120"/>
+            <a:ext cx="2011680" cy="365760"/>
+          </a:xfrm>
+          <a:prstGeom prst="rect">
+            <a:avLst/>
+          </a:prstGeom>
+          <a:noFill/>
+        </p:spPr>
+        <p:txBody>
+          <a:bodyPr wrap="square">
+            <a:spAutoFit/>
+          </a:bodyPr>
+          <a:lstStyle/>
+          <a:p>
+            <a:pPr algn="l">
+              <a:defRPr sz="1200" b="1">
                 <a:solidFill>
                   <a:srgbClr val="C80000"/>
                 </a:solidFill>
@@ -5906,8 +5906,8 @@
         </p:nvSpPr>
         <p:spPr>
           <a:xfrm>
-            <a:off x="457200" y="3383280"/>
-            <a:ext cx="5943600" cy="457200"/>
+            <a:off x="457200" y="3749040"/>
+            <a:ext cx="6858000" cy="548640"/>
           </a:xfrm>
           <a:prstGeom prst="rect">
             <a:avLst/>
@@ -5949,22 +5949,22 @@
         </p:nvSpPr>
         <p:spPr>
           <a:xfrm>
-            <a:off x="640080" y="3456432"/>
-            <a:ext cx="4114800" cy="320040"/>
-          </a:xfrm>
-          <a:prstGeom prst="rect">
-            <a:avLst/>
-          </a:prstGeom>
-          <a:noFill/>
-        </p:spPr>
-        <p:txBody>
-          <a:bodyPr wrap="square">
-            <a:spAutoFit/>
-          </a:bodyPr>
-          <a:lstStyle/>
-          <a:p>
-            <a:pPr algn="l">
-              <a:defRPr sz="1200" b="0">
+            <a:off x="640080" y="3840480"/>
+            <a:ext cx="4572000" cy="365760"/>
+          </a:xfrm>
+          <a:prstGeom prst="rect">
+            <a:avLst/>
+          </a:prstGeom>
+          <a:noFill/>
+        </p:spPr>
+        <p:txBody>
+          <a:bodyPr wrap="square">
+            <a:spAutoFit/>
+          </a:bodyPr>
+          <a:lstStyle/>
+          <a:p>
+            <a:pPr algn="l">
+              <a:defRPr sz="1400" b="0">
                 <a:solidFill>
                   <a:srgbClr val="333333"/>
                 </a:solidFill>
@@ -5985,22 +5985,22 @@
         </p:nvSpPr>
         <p:spPr>
           <a:xfrm>
-            <a:off x="4846320" y="3456432"/>
-            <a:ext cx="1554480" cy="320040"/>
-          </a:xfrm>
-          <a:prstGeom prst="rect">
-            <a:avLst/>
-          </a:prstGeom>
-          <a:noFill/>
-        </p:spPr>
-        <p:txBody>
-          <a:bodyPr wrap="square">
-            <a:spAutoFit/>
-          </a:bodyPr>
-          <a:lstStyle/>
-          <a:p>
-            <a:pPr algn="l">
-              <a:defRPr sz="1000" b="1">
+            <a:off x="5303520" y="3840480"/>
+            <a:ext cx="2011680" cy="365760"/>
+          </a:xfrm>
+          <a:prstGeom prst="rect">
+            <a:avLst/>
+          </a:prstGeom>
+          <a:noFill/>
+        </p:spPr>
+        <p:txBody>
+          <a:bodyPr wrap="square">
+            <a:spAutoFit/>
+          </a:bodyPr>
+          <a:lstStyle/>
+          <a:p>
+            <a:pPr algn="l">
+              <a:defRPr sz="1200" b="1">
                 <a:solidFill>
                   <a:srgbClr val="C80000"/>
                 </a:solidFill>
@@ -6021,8 +6021,8 @@
         </p:nvSpPr>
         <p:spPr>
           <a:xfrm>
-            <a:off x="457200" y="3886200"/>
-            <a:ext cx="5943600" cy="457200"/>
+            <a:off x="457200" y="4343400"/>
+            <a:ext cx="6858000" cy="548640"/>
           </a:xfrm>
           <a:prstGeom prst="rect">
             <a:avLst/>
@@ -6064,22 +6064,22 @@
         </p:nvSpPr>
         <p:spPr>
           <a:xfrm>
-            <a:off x="640080" y="3959352"/>
-            <a:ext cx="4114800" cy="320040"/>
-          </a:xfrm>
-          <a:prstGeom prst="rect">
-            <a:avLst/>
-          </a:prstGeom>
-          <a:noFill/>
-        </p:spPr>
-        <p:txBody>
-          <a:bodyPr wrap="square">
-            <a:spAutoFit/>
-          </a:bodyPr>
-          <a:lstStyle/>
-          <a:p>
-            <a:pPr algn="l">
-              <a:defRPr sz="1200" b="0">
+            <a:off x="640080" y="4434840"/>
+            <a:ext cx="4572000" cy="365760"/>
+          </a:xfrm>
+          <a:prstGeom prst="rect">
+            <a:avLst/>
+          </a:prstGeom>
+          <a:noFill/>
+        </p:spPr>
+        <p:txBody>
+          <a:bodyPr wrap="square">
+            <a:spAutoFit/>
+          </a:bodyPr>
+          <a:lstStyle/>
+          <a:p>
+            <a:pPr algn="l">
+              <a:defRPr sz="1400" b="0">
                 <a:solidFill>
                   <a:srgbClr val="333333"/>
                 </a:solidFill>
@@ -6100,22 +6100,22 @@
         </p:nvSpPr>
         <p:spPr>
           <a:xfrm>
-            <a:off x="4846320" y="3959352"/>
-            <a:ext cx="1554480" cy="320040"/>
-          </a:xfrm>
-          <a:prstGeom prst="rect">
-            <a:avLst/>
-          </a:prstGeom>
-          <a:noFill/>
-        </p:spPr>
-        <p:txBody>
-          <a:bodyPr wrap="square">
-            <a:spAutoFit/>
-          </a:bodyPr>
-          <a:lstStyle/>
-          <a:p>
-            <a:pPr algn="l">
-              <a:defRPr sz="1000" b="1">
+            <a:off x="5303520" y="4434840"/>
+            <a:ext cx="2011680" cy="365760"/>
+          </a:xfrm>
+          <a:prstGeom prst="rect">
+            <a:avLst/>
+          </a:prstGeom>
+          <a:noFill/>
+        </p:spPr>
+        <p:txBody>
+          <a:bodyPr wrap="square">
+            <a:spAutoFit/>
+          </a:bodyPr>
+          <a:lstStyle/>
+          <a:p>
+            <a:pPr algn="l">
+              <a:defRPr sz="1200" b="1">
                 <a:solidFill>
                   <a:srgbClr val="008000"/>
                 </a:solidFill>
@@ -6136,8 +6136,8 @@
         </p:nvSpPr>
         <p:spPr>
           <a:xfrm>
-            <a:off x="457200" y="4389120"/>
-            <a:ext cx="5943600" cy="457200"/>
+            <a:off x="457200" y="4937760"/>
+            <a:ext cx="6858000" cy="548640"/>
           </a:xfrm>
           <a:prstGeom prst="rect">
             <a:avLst/>
@@ -6179,22 +6179,22 @@
         </p:nvSpPr>
         <p:spPr>
           <a:xfrm>
-            <a:off x="640080" y="4462272"/>
-            <a:ext cx="4114800" cy="320040"/>
-          </a:xfrm>
-          <a:prstGeom prst="rect">
-            <a:avLst/>
-          </a:prstGeom>
-          <a:noFill/>
-        </p:spPr>
-        <p:txBody>
-          <a:bodyPr wrap="square">
-            <a:spAutoFit/>
-          </a:bodyPr>
-          <a:lstStyle/>
-          <a:p>
-            <a:pPr algn="l">
-              <a:defRPr sz="1200" b="0">
+            <a:off x="640080" y="5029200"/>
+            <a:ext cx="4572000" cy="365760"/>
+          </a:xfrm>
+          <a:prstGeom prst="rect">
+            <a:avLst/>
+          </a:prstGeom>
+          <a:noFill/>
+        </p:spPr>
+        <p:txBody>
+          <a:bodyPr wrap="square">
+            <a:spAutoFit/>
+          </a:bodyPr>
+          <a:lstStyle/>
+          <a:p>
+            <a:pPr algn="l">
+              <a:defRPr sz="1400" b="0">
                 <a:solidFill>
                   <a:srgbClr val="333333"/>
                 </a:solidFill>
@@ -6215,22 +6215,22 @@
         </p:nvSpPr>
         <p:spPr>
           <a:xfrm>
-            <a:off x="4846320" y="4462272"/>
-            <a:ext cx="1554480" cy="320040"/>
-          </a:xfrm>
-          <a:prstGeom prst="rect">
-            <a:avLst/>
-          </a:prstGeom>
-          <a:noFill/>
-        </p:spPr>
-        <p:txBody>
-          <a:bodyPr wrap="square">
-            <a:spAutoFit/>
-          </a:bodyPr>
-          <a:lstStyle/>
-          <a:p>
-            <a:pPr algn="l">
-              <a:defRPr sz="1000" b="1">
+            <a:off x="5303520" y="5029200"/>
+            <a:ext cx="2011680" cy="365760"/>
+          </a:xfrm>
+          <a:prstGeom prst="rect">
+            <a:avLst/>
+          </a:prstGeom>
+          <a:noFill/>
+        </p:spPr>
+        <p:txBody>
+          <a:bodyPr wrap="square">
+            <a:spAutoFit/>
+          </a:bodyPr>
+          <a:lstStyle/>
+          <a:p>
+            <a:pPr algn="l">
+              <a:defRPr sz="1200" b="1">
                 <a:solidFill>
                   <a:srgbClr val="008000"/>
                 </a:solidFill>
@@ -6251,22 +6251,22 @@
         </p:nvSpPr>
         <p:spPr>
           <a:xfrm>
-            <a:off x="6858000" y="1371600"/>
-            <a:ext cx="4572000" cy="274320"/>
-          </a:xfrm>
-          <a:prstGeom prst="rect">
-            <a:avLst/>
-          </a:prstGeom>
-          <a:noFill/>
-        </p:spPr>
-        <p:txBody>
-          <a:bodyPr wrap="square">
-            <a:spAutoFit/>
-          </a:bodyPr>
-          <a:lstStyle/>
-          <a:p>
-            <a:pPr algn="l">
-              <a:defRPr sz="1200" b="1">
+            <a:off x="7772400" y="1371600"/>
+            <a:ext cx="4114800" cy="365760"/>
+          </a:xfrm>
+          <a:prstGeom prst="rect">
+            <a:avLst/>
+          </a:prstGeom>
+          <a:noFill/>
+        </p:spPr>
+        <p:txBody>
+          <a:bodyPr wrap="square">
+            <a:spAutoFit/>
+          </a:bodyPr>
+          <a:lstStyle/>
+          <a:p>
+            <a:pPr algn="l">
+              <a:defRPr sz="1400" b="1">
                 <a:solidFill>
                   <a:srgbClr val="E60000"/>
                 </a:solidFill>
@@ -6287,8 +6287,8 @@
         </p:nvSpPr>
         <p:spPr>
           <a:xfrm>
-            <a:off x="6858000" y="1737360"/>
-            <a:ext cx="4572000" cy="2743200"/>
+            <a:off x="7772400" y="1828800"/>
+            <a:ext cx="4114800" cy="3200400"/>
           </a:xfrm>
           <a:prstGeom prst="rect">
             <a:avLst/>
@@ -6305,7 +6305,7 @@
               <a:spcAft>
                 <a:spcPts val="400"/>
               </a:spcAft>
-              <a:defRPr sz="1100">
+              <a:defRPr sz="1300">
                 <a:solidFill>
                   <a:srgbClr val="333333"/>
                 </a:solidFill>
@@ -6321,7 +6321,7 @@
               <a:spcAft>
                 <a:spcPts val="400"/>
               </a:spcAft>
-              <a:defRPr sz="1100">
+              <a:defRPr sz="1300">
                 <a:solidFill>
                   <a:srgbClr val="333333"/>
                 </a:solidFill>
@@ -6337,7 +6337,7 @@
               <a:spcAft>
                 <a:spcPts val="400"/>
               </a:spcAft>
-              <a:defRPr sz="1100">
+              <a:defRPr sz="1300">
                 <a:solidFill>
                   <a:srgbClr val="333333"/>
                 </a:solidFill>
@@ -6353,7 +6353,7 @@
               <a:spcAft>
                 <a:spcPts val="400"/>
               </a:spcAft>
-              <a:defRPr sz="1100">
+              <a:defRPr sz="1300">
                 <a:solidFill>
                   <a:srgbClr val="333333"/>
                 </a:solidFill>
@@ -7755,7 +7755,7 @@
         <p:spPr>
           <a:xfrm>
             <a:off x="457200" y="1280160"/>
-            <a:ext cx="10972800" cy="502920"/>
+            <a:ext cx="11247120" cy="594360"/>
           </a:xfrm>
           <a:prstGeom prst="rect">
             <a:avLst/>
@@ -7797,8 +7797,8 @@
         </p:nvSpPr>
         <p:spPr>
           <a:xfrm>
-            <a:off x="548640" y="1353312"/>
-            <a:ext cx="411480" cy="320040"/>
+            <a:off x="640080" y="1371600"/>
+            <a:ext cx="502920" cy="384048"/>
           </a:xfrm>
           <a:prstGeom prst="rect">
             <a:avLst/>
@@ -7840,8 +7840,8 @@
         </p:nvSpPr>
         <p:spPr>
           <a:xfrm>
-            <a:off x="548640" y="1371600"/>
-            <a:ext cx="411480" cy="274320"/>
+            <a:off x="640080" y="1389888"/>
+            <a:ext cx="502920" cy="347472"/>
           </a:xfrm>
           <a:prstGeom prst="rect">
             <a:avLst/>
@@ -7855,7 +7855,7 @@
           <a:lstStyle/>
           <a:p>
             <a:pPr algn="ctr">
-              <a:defRPr sz="900" b="1">
+              <a:defRPr sz="1100" b="1">
                 <a:solidFill>
                   <a:srgbClr val="FFFFFF"/>
                 </a:solidFill>
@@ -7876,22 +7876,22 @@
         </p:nvSpPr>
         <p:spPr>
           <a:xfrm>
-            <a:off x="1097280" y="1371600"/>
-            <a:ext cx="3200400" cy="274320"/>
-          </a:xfrm>
-          <a:prstGeom prst="rect">
-            <a:avLst/>
-          </a:prstGeom>
-          <a:noFill/>
-        </p:spPr>
-        <p:txBody>
-          <a:bodyPr wrap="square">
-            <a:spAutoFit/>
-          </a:bodyPr>
-          <a:lstStyle/>
-          <a:p>
-            <a:pPr algn="l">
-              <a:defRPr sz="1200" b="1">
+            <a:off x="1371600" y="1389888"/>
+            <a:ext cx="4114800" cy="347472"/>
+          </a:xfrm>
+          <a:prstGeom prst="rect">
+            <a:avLst/>
+          </a:prstGeom>
+          <a:noFill/>
+        </p:spPr>
+        <p:txBody>
+          <a:bodyPr wrap="square">
+            <a:spAutoFit/>
+          </a:bodyPr>
+          <a:lstStyle/>
+          <a:p>
+            <a:pPr algn="l">
+              <a:defRPr sz="1400" b="1">
                 <a:solidFill>
                   <a:srgbClr val="333333"/>
                 </a:solidFill>
@@ -7912,22 +7912,22 @@
         </p:nvSpPr>
         <p:spPr>
           <a:xfrm>
-            <a:off x="4572000" y="1371600"/>
-            <a:ext cx="1371600" cy="274320"/>
-          </a:xfrm>
-          <a:prstGeom prst="rect">
-            <a:avLst/>
-          </a:prstGeom>
-          <a:noFill/>
-        </p:spPr>
-        <p:txBody>
-          <a:bodyPr wrap="square">
-            <a:spAutoFit/>
-          </a:bodyPr>
-          <a:lstStyle/>
-          <a:p>
-            <a:pPr algn="l">
-              <a:defRPr sz="1100" b="0">
+            <a:off x="5669280" y="1389888"/>
+            <a:ext cx="2286000" cy="347472"/>
+          </a:xfrm>
+          <a:prstGeom prst="rect">
+            <a:avLst/>
+          </a:prstGeom>
+          <a:noFill/>
+        </p:spPr>
+        <p:txBody>
+          <a:bodyPr wrap="square">
+            <a:spAutoFit/>
+          </a:bodyPr>
+          <a:lstStyle/>
+          <a:p>
+            <a:pPr algn="l">
+              <a:defRPr sz="1300" b="0">
                 <a:solidFill>
                   <a:srgbClr val="333333"/>
                 </a:solidFill>
@@ -7948,22 +7948,22 @@
         </p:nvSpPr>
         <p:spPr>
           <a:xfrm>
-            <a:off x="6217920" y="1371600"/>
-            <a:ext cx="1371600" cy="274320"/>
-          </a:xfrm>
-          <a:prstGeom prst="rect">
-            <a:avLst/>
-          </a:prstGeom>
-          <a:noFill/>
-        </p:spPr>
-        <p:txBody>
-          <a:bodyPr wrap="square">
-            <a:spAutoFit/>
-          </a:bodyPr>
-          <a:lstStyle/>
-          <a:p>
-            <a:pPr algn="l">
-              <a:defRPr sz="1100" b="0">
+            <a:off x="8229600" y="1389888"/>
+            <a:ext cx="2743200" cy="347472"/>
+          </a:xfrm>
+          <a:prstGeom prst="rect">
+            <a:avLst/>
+          </a:prstGeom>
+          <a:noFill/>
+        </p:spPr>
+        <p:txBody>
+          <a:bodyPr wrap="square">
+            <a:spAutoFit/>
+          </a:bodyPr>
+          <a:lstStyle/>
+          <a:p>
+            <a:pPr algn="l">
+              <a:defRPr sz="1300" b="1">
                 <a:solidFill>
                   <a:srgbClr val="008000"/>
                 </a:solidFill>
@@ -7984,8 +7984,8 @@
         </p:nvSpPr>
         <p:spPr>
           <a:xfrm>
-            <a:off x="457200" y="1828800"/>
-            <a:ext cx="10972800" cy="502920"/>
+            <a:off x="457200" y="1920240"/>
+            <a:ext cx="11247120" cy="594360"/>
           </a:xfrm>
           <a:prstGeom prst="rect">
             <a:avLst/>
@@ -8027,8 +8027,8 @@
         </p:nvSpPr>
         <p:spPr>
           <a:xfrm>
-            <a:off x="548640" y="1901952"/>
-            <a:ext cx="411480" cy="320040"/>
+            <a:off x="640080" y="2011680"/>
+            <a:ext cx="502920" cy="384048"/>
           </a:xfrm>
           <a:prstGeom prst="rect">
             <a:avLst/>
@@ -8070,8 +8070,8 @@
         </p:nvSpPr>
         <p:spPr>
           <a:xfrm>
-            <a:off x="548640" y="1920240"/>
-            <a:ext cx="411480" cy="274320"/>
+            <a:off x="640080" y="2029968"/>
+            <a:ext cx="502920" cy="347472"/>
           </a:xfrm>
           <a:prstGeom prst="rect">
             <a:avLst/>
@@ -8085,7 +8085,7 @@
           <a:lstStyle/>
           <a:p>
             <a:pPr algn="ctr">
-              <a:defRPr sz="900" b="1">
+              <a:defRPr sz="1100" b="1">
                 <a:solidFill>
                   <a:srgbClr val="FFFFFF"/>
                 </a:solidFill>
@@ -8106,22 +8106,22 @@
         </p:nvSpPr>
         <p:spPr>
           <a:xfrm>
-            <a:off x="1097280" y="1920240"/>
-            <a:ext cx="3200400" cy="274320"/>
-          </a:xfrm>
-          <a:prstGeom prst="rect">
-            <a:avLst/>
-          </a:prstGeom>
-          <a:noFill/>
-        </p:spPr>
-        <p:txBody>
-          <a:bodyPr wrap="square">
-            <a:spAutoFit/>
-          </a:bodyPr>
-          <a:lstStyle/>
-          <a:p>
-            <a:pPr algn="l">
-              <a:defRPr sz="1200" b="1">
+            <a:off x="1371600" y="2029968"/>
+            <a:ext cx="4114800" cy="347472"/>
+          </a:xfrm>
+          <a:prstGeom prst="rect">
+            <a:avLst/>
+          </a:prstGeom>
+          <a:noFill/>
+        </p:spPr>
+        <p:txBody>
+          <a:bodyPr wrap="square">
+            <a:spAutoFit/>
+          </a:bodyPr>
+          <a:lstStyle/>
+          <a:p>
+            <a:pPr algn="l">
+              <a:defRPr sz="1400" b="1">
                 <a:solidFill>
                   <a:srgbClr val="333333"/>
                 </a:solidFill>
@@ -8142,22 +8142,22 @@
         </p:nvSpPr>
         <p:spPr>
           <a:xfrm>
-            <a:off x="4572000" y="1920240"/>
-            <a:ext cx="1371600" cy="274320"/>
-          </a:xfrm>
-          <a:prstGeom prst="rect">
-            <a:avLst/>
-          </a:prstGeom>
-          <a:noFill/>
-        </p:spPr>
-        <p:txBody>
-          <a:bodyPr wrap="square">
-            <a:spAutoFit/>
-          </a:bodyPr>
-          <a:lstStyle/>
-          <a:p>
-            <a:pPr algn="l">
-              <a:defRPr sz="1100" b="0">
+            <a:off x="5669280" y="2029968"/>
+            <a:ext cx="2286000" cy="347472"/>
+          </a:xfrm>
+          <a:prstGeom prst="rect">
+            <a:avLst/>
+          </a:prstGeom>
+          <a:noFill/>
+        </p:spPr>
+        <p:txBody>
+          <a:bodyPr wrap="square">
+            <a:spAutoFit/>
+          </a:bodyPr>
+          <a:lstStyle/>
+          <a:p>
+            <a:pPr algn="l">
+              <a:defRPr sz="1300" b="0">
                 <a:solidFill>
                   <a:srgbClr val="333333"/>
                 </a:solidFill>
@@ -8178,22 +8178,22 @@
         </p:nvSpPr>
         <p:spPr>
           <a:xfrm>
-            <a:off x="6217920" y="1920240"/>
-            <a:ext cx="1371600" cy="274320"/>
-          </a:xfrm>
-          <a:prstGeom prst="rect">
-            <a:avLst/>
-          </a:prstGeom>
-          <a:noFill/>
-        </p:spPr>
-        <p:txBody>
-          <a:bodyPr wrap="square">
-            <a:spAutoFit/>
-          </a:bodyPr>
-          <a:lstStyle/>
-          <a:p>
-            <a:pPr algn="l">
-              <a:defRPr sz="1100" b="0">
+            <a:off x="8229600" y="2029968"/>
+            <a:ext cx="2743200" cy="347472"/>
+          </a:xfrm>
+          <a:prstGeom prst="rect">
+            <a:avLst/>
+          </a:prstGeom>
+          <a:noFill/>
+        </p:spPr>
+        <p:txBody>
+          <a:bodyPr wrap="square">
+            <a:spAutoFit/>
+          </a:bodyPr>
+          <a:lstStyle/>
+          <a:p>
+            <a:pPr algn="l">
+              <a:defRPr sz="1300" b="1">
                 <a:solidFill>
                   <a:srgbClr val="808080"/>
                 </a:solidFill>
@@ -8214,8 +8214,8 @@
         </p:nvSpPr>
         <p:spPr>
           <a:xfrm>
-            <a:off x="457200" y="2377440"/>
-            <a:ext cx="10972800" cy="502920"/>
+            <a:off x="457200" y="2560320"/>
+            <a:ext cx="11247120" cy="594360"/>
           </a:xfrm>
           <a:prstGeom prst="rect">
             <a:avLst/>
@@ -8257,8 +8257,8 @@
         </p:nvSpPr>
         <p:spPr>
           <a:xfrm>
-            <a:off x="548640" y="2450592"/>
-            <a:ext cx="411480" cy="320040"/>
+            <a:off x="640080" y="2651760"/>
+            <a:ext cx="502920" cy="384048"/>
           </a:xfrm>
           <a:prstGeom prst="rect">
             <a:avLst/>
@@ -8300,8 +8300,8 @@
         </p:nvSpPr>
         <p:spPr>
           <a:xfrm>
-            <a:off x="548640" y="2468880"/>
-            <a:ext cx="411480" cy="274320"/>
+            <a:off x="640080" y="2670048"/>
+            <a:ext cx="502920" cy="347472"/>
           </a:xfrm>
           <a:prstGeom prst="rect">
             <a:avLst/>
@@ -8315,7 +8315,7 @@
           <a:lstStyle/>
           <a:p>
             <a:pPr algn="ctr">
-              <a:defRPr sz="900" b="1">
+              <a:defRPr sz="1100" b="1">
                 <a:solidFill>
                   <a:srgbClr val="FFFFFF"/>
                 </a:solidFill>
@@ -8336,22 +8336,22 @@
         </p:nvSpPr>
         <p:spPr>
           <a:xfrm>
-            <a:off x="1097280" y="2468880"/>
-            <a:ext cx="3200400" cy="274320"/>
-          </a:xfrm>
-          <a:prstGeom prst="rect">
-            <a:avLst/>
-          </a:prstGeom>
-          <a:noFill/>
-        </p:spPr>
-        <p:txBody>
-          <a:bodyPr wrap="square">
-            <a:spAutoFit/>
-          </a:bodyPr>
-          <a:lstStyle/>
-          <a:p>
-            <a:pPr algn="l">
-              <a:defRPr sz="1200" b="1">
+            <a:off x="1371600" y="2670048"/>
+            <a:ext cx="4114800" cy="347472"/>
+          </a:xfrm>
+          <a:prstGeom prst="rect">
+            <a:avLst/>
+          </a:prstGeom>
+          <a:noFill/>
+        </p:spPr>
+        <p:txBody>
+          <a:bodyPr wrap="square">
+            <a:spAutoFit/>
+          </a:bodyPr>
+          <a:lstStyle/>
+          <a:p>
+            <a:pPr algn="l">
+              <a:defRPr sz="1400" b="1">
                 <a:solidFill>
                   <a:srgbClr val="333333"/>
                 </a:solidFill>
@@ -8372,22 +8372,22 @@
         </p:nvSpPr>
         <p:spPr>
           <a:xfrm>
-            <a:off x="4572000" y="2468880"/>
-            <a:ext cx="1371600" cy="274320"/>
-          </a:xfrm>
-          <a:prstGeom prst="rect">
-            <a:avLst/>
-          </a:prstGeom>
-          <a:noFill/>
-        </p:spPr>
-        <p:txBody>
-          <a:bodyPr wrap="square">
-            <a:spAutoFit/>
-          </a:bodyPr>
-          <a:lstStyle/>
-          <a:p>
-            <a:pPr algn="l">
-              <a:defRPr sz="1100" b="0">
+            <a:off x="5669280" y="2670048"/>
+            <a:ext cx="2286000" cy="347472"/>
+          </a:xfrm>
+          <a:prstGeom prst="rect">
+            <a:avLst/>
+          </a:prstGeom>
+          <a:noFill/>
+        </p:spPr>
+        <p:txBody>
+          <a:bodyPr wrap="square">
+            <a:spAutoFit/>
+          </a:bodyPr>
+          <a:lstStyle/>
+          <a:p>
+            <a:pPr algn="l">
+              <a:defRPr sz="1300" b="0">
                 <a:solidFill>
                   <a:srgbClr val="333333"/>
                 </a:solidFill>
@@ -8408,22 +8408,22 @@
         </p:nvSpPr>
         <p:spPr>
           <a:xfrm>
-            <a:off x="6217920" y="2468880"/>
-            <a:ext cx="1371600" cy="274320"/>
-          </a:xfrm>
-          <a:prstGeom prst="rect">
-            <a:avLst/>
-          </a:prstGeom>
-          <a:noFill/>
-        </p:spPr>
-        <p:txBody>
-          <a:bodyPr wrap="square">
-            <a:spAutoFit/>
-          </a:bodyPr>
-          <a:lstStyle/>
-          <a:p>
-            <a:pPr algn="l">
-              <a:defRPr sz="1100" b="0">
+            <a:off x="8229600" y="2670048"/>
+            <a:ext cx="2743200" cy="347472"/>
+          </a:xfrm>
+          <a:prstGeom prst="rect">
+            <a:avLst/>
+          </a:prstGeom>
+          <a:noFill/>
+        </p:spPr>
+        <p:txBody>
+          <a:bodyPr wrap="square">
+            <a:spAutoFit/>
+          </a:bodyPr>
+          <a:lstStyle/>
+          <a:p>
+            <a:pPr algn="l">
+              <a:defRPr sz="1300" b="1">
                 <a:solidFill>
                   <a:srgbClr val="C80000"/>
                 </a:solidFill>
@@ -8444,8 +8444,8 @@
         </p:nvSpPr>
         <p:spPr>
           <a:xfrm>
-            <a:off x="457200" y="2926080"/>
-            <a:ext cx="10972800" cy="502920"/>
+            <a:off x="457200" y="3200400"/>
+            <a:ext cx="11247120" cy="594360"/>
           </a:xfrm>
           <a:prstGeom prst="rect">
             <a:avLst/>
@@ -8487,8 +8487,8 @@
         </p:nvSpPr>
         <p:spPr>
           <a:xfrm>
-            <a:off x="548640" y="2999232"/>
-            <a:ext cx="411480" cy="320040"/>
+            <a:off x="640080" y="3291840"/>
+            <a:ext cx="502920" cy="384048"/>
           </a:xfrm>
           <a:prstGeom prst="rect">
             <a:avLst/>
@@ -8530,8 +8530,8 @@
         </p:nvSpPr>
         <p:spPr>
           <a:xfrm>
-            <a:off x="548640" y="3017520"/>
-            <a:ext cx="411480" cy="274320"/>
+            <a:off x="640080" y="3310128"/>
+            <a:ext cx="502920" cy="347472"/>
           </a:xfrm>
           <a:prstGeom prst="rect">
             <a:avLst/>
@@ -8545,7 +8545,7 @@
           <a:lstStyle/>
           <a:p>
             <a:pPr algn="ctr">
-              <a:defRPr sz="900" b="1">
+              <a:defRPr sz="1100" b="1">
                 <a:solidFill>
                   <a:srgbClr val="FFFFFF"/>
                 </a:solidFill>
@@ -8566,22 +8566,22 @@
         </p:nvSpPr>
         <p:spPr>
           <a:xfrm>
-            <a:off x="1097280" y="3017520"/>
-            <a:ext cx="3200400" cy="274320"/>
-          </a:xfrm>
-          <a:prstGeom prst="rect">
-            <a:avLst/>
-          </a:prstGeom>
-          <a:noFill/>
-        </p:spPr>
-        <p:txBody>
-          <a:bodyPr wrap="square">
-            <a:spAutoFit/>
-          </a:bodyPr>
-          <a:lstStyle/>
-          <a:p>
-            <a:pPr algn="l">
-              <a:defRPr sz="1200" b="1">
+            <a:off x="1371600" y="3310128"/>
+            <a:ext cx="4114800" cy="347472"/>
+          </a:xfrm>
+          <a:prstGeom prst="rect">
+            <a:avLst/>
+          </a:prstGeom>
+          <a:noFill/>
+        </p:spPr>
+        <p:txBody>
+          <a:bodyPr wrap="square">
+            <a:spAutoFit/>
+          </a:bodyPr>
+          <a:lstStyle/>
+          <a:p>
+            <a:pPr algn="l">
+              <a:defRPr sz="1400" b="1">
                 <a:solidFill>
                   <a:srgbClr val="333333"/>
                 </a:solidFill>
@@ -8602,22 +8602,22 @@
         </p:nvSpPr>
         <p:spPr>
           <a:xfrm>
-            <a:off x="4572000" y="3017520"/>
-            <a:ext cx="1371600" cy="274320"/>
-          </a:xfrm>
-          <a:prstGeom prst="rect">
-            <a:avLst/>
-          </a:prstGeom>
-          <a:noFill/>
-        </p:spPr>
-        <p:txBody>
-          <a:bodyPr wrap="square">
-            <a:spAutoFit/>
-          </a:bodyPr>
-          <a:lstStyle/>
-          <a:p>
-            <a:pPr algn="l">
-              <a:defRPr sz="1100" b="0">
+            <a:off x="5669280" y="3310128"/>
+            <a:ext cx="2286000" cy="347472"/>
+          </a:xfrm>
+          <a:prstGeom prst="rect">
+            <a:avLst/>
+          </a:prstGeom>
+          <a:noFill/>
+        </p:spPr>
+        <p:txBody>
+          <a:bodyPr wrap="square">
+            <a:spAutoFit/>
+          </a:bodyPr>
+          <a:lstStyle/>
+          <a:p>
+            <a:pPr algn="l">
+              <a:defRPr sz="1300" b="0">
                 <a:solidFill>
                   <a:srgbClr val="333333"/>
                 </a:solidFill>
@@ -8638,22 +8638,22 @@
         </p:nvSpPr>
         <p:spPr>
           <a:xfrm>
-            <a:off x="6217920" y="3017520"/>
-            <a:ext cx="1371600" cy="274320"/>
-          </a:xfrm>
-          <a:prstGeom prst="rect">
-            <a:avLst/>
-          </a:prstGeom>
-          <a:noFill/>
-        </p:spPr>
-        <p:txBody>
-          <a:bodyPr wrap="square">
-            <a:spAutoFit/>
-          </a:bodyPr>
-          <a:lstStyle/>
-          <a:p>
-            <a:pPr algn="l">
-              <a:defRPr sz="1100" b="0">
+            <a:off x="8229600" y="3310128"/>
+            <a:ext cx="2743200" cy="347472"/>
+          </a:xfrm>
+          <a:prstGeom prst="rect">
+            <a:avLst/>
+          </a:prstGeom>
+          <a:noFill/>
+        </p:spPr>
+        <p:txBody>
+          <a:bodyPr wrap="square">
+            <a:spAutoFit/>
+          </a:bodyPr>
+          <a:lstStyle/>
+          <a:p>
+            <a:pPr algn="l">
+              <a:defRPr sz="1300" b="1">
                 <a:solidFill>
                   <a:srgbClr val="008000"/>
                 </a:solidFill>
@@ -8674,8 +8674,8 @@
         </p:nvSpPr>
         <p:spPr>
           <a:xfrm>
-            <a:off x="457200" y="3474720"/>
-            <a:ext cx="10972800" cy="502920"/>
+            <a:off x="457200" y="3840480"/>
+            <a:ext cx="11247120" cy="594360"/>
           </a:xfrm>
           <a:prstGeom prst="rect">
             <a:avLst/>
@@ -8717,8 +8717,8 @@
         </p:nvSpPr>
         <p:spPr>
           <a:xfrm>
-            <a:off x="548640" y="3547872"/>
-            <a:ext cx="411480" cy="320040"/>
+            <a:off x="640080" y="3931920"/>
+            <a:ext cx="502920" cy="384048"/>
           </a:xfrm>
           <a:prstGeom prst="rect">
             <a:avLst/>
@@ -8760,8 +8760,8 @@
         </p:nvSpPr>
         <p:spPr>
           <a:xfrm>
-            <a:off x="548640" y="3566160"/>
-            <a:ext cx="411480" cy="274320"/>
+            <a:off x="640080" y="3950208"/>
+            <a:ext cx="502920" cy="347472"/>
           </a:xfrm>
           <a:prstGeom prst="rect">
             <a:avLst/>
@@ -8775,7 +8775,7 @@
           <a:lstStyle/>
           <a:p>
             <a:pPr algn="ctr">
-              <a:defRPr sz="900" b="1">
+              <a:defRPr sz="1100" b="1">
                 <a:solidFill>
                   <a:srgbClr val="FFFFFF"/>
                 </a:solidFill>
@@ -8796,22 +8796,22 @@
         </p:nvSpPr>
         <p:spPr>
           <a:xfrm>
-            <a:off x="1097280" y="3566160"/>
-            <a:ext cx="3200400" cy="274320"/>
-          </a:xfrm>
-          <a:prstGeom prst="rect">
-            <a:avLst/>
-          </a:prstGeom>
-          <a:noFill/>
-        </p:spPr>
-        <p:txBody>
-          <a:bodyPr wrap="square">
-            <a:spAutoFit/>
-          </a:bodyPr>
-          <a:lstStyle/>
-          <a:p>
-            <a:pPr algn="l">
-              <a:defRPr sz="1200" b="1">
+            <a:off x="1371600" y="3950208"/>
+            <a:ext cx="4114800" cy="347472"/>
+          </a:xfrm>
+          <a:prstGeom prst="rect">
+            <a:avLst/>
+          </a:prstGeom>
+          <a:noFill/>
+        </p:spPr>
+        <p:txBody>
+          <a:bodyPr wrap="square">
+            <a:spAutoFit/>
+          </a:bodyPr>
+          <a:lstStyle/>
+          <a:p>
+            <a:pPr algn="l">
+              <a:defRPr sz="1400" b="1">
                 <a:solidFill>
                   <a:srgbClr val="333333"/>
                 </a:solidFill>
@@ -8832,22 +8832,22 @@
         </p:nvSpPr>
         <p:spPr>
           <a:xfrm>
-            <a:off x="4572000" y="3566160"/>
-            <a:ext cx="1371600" cy="274320"/>
-          </a:xfrm>
-          <a:prstGeom prst="rect">
-            <a:avLst/>
-          </a:prstGeom>
-          <a:noFill/>
-        </p:spPr>
-        <p:txBody>
-          <a:bodyPr wrap="square">
-            <a:spAutoFit/>
-          </a:bodyPr>
-          <a:lstStyle/>
-          <a:p>
-            <a:pPr algn="l">
-              <a:defRPr sz="1100" b="0">
+            <a:off x="5669280" y="3950208"/>
+            <a:ext cx="2286000" cy="347472"/>
+          </a:xfrm>
+          <a:prstGeom prst="rect">
+            <a:avLst/>
+          </a:prstGeom>
+          <a:noFill/>
+        </p:spPr>
+        <p:txBody>
+          <a:bodyPr wrap="square">
+            <a:spAutoFit/>
+          </a:bodyPr>
+          <a:lstStyle/>
+          <a:p>
+            <a:pPr algn="l">
+              <a:defRPr sz="1300" b="0">
                 <a:solidFill>
                   <a:srgbClr val="333333"/>
                 </a:solidFill>
@@ -8868,22 +8868,22 @@
         </p:nvSpPr>
         <p:spPr>
           <a:xfrm>
-            <a:off x="6217920" y="3566160"/>
-            <a:ext cx="1371600" cy="274320"/>
-          </a:xfrm>
-          <a:prstGeom prst="rect">
-            <a:avLst/>
-          </a:prstGeom>
-          <a:noFill/>
-        </p:spPr>
-        <p:txBody>
-          <a:bodyPr wrap="square">
-            <a:spAutoFit/>
-          </a:bodyPr>
-          <a:lstStyle/>
-          <a:p>
-            <a:pPr algn="l">
-              <a:defRPr sz="1100" b="0">
+            <a:off x="8229600" y="3950208"/>
+            <a:ext cx="2743200" cy="347472"/>
+          </a:xfrm>
+          <a:prstGeom prst="rect">
+            <a:avLst/>
+          </a:prstGeom>
+          <a:noFill/>
+        </p:spPr>
+        <p:txBody>
+          <a:bodyPr wrap="square">
+            <a:spAutoFit/>
+          </a:bodyPr>
+          <a:lstStyle/>
+          <a:p>
+            <a:pPr algn="l">
+              <a:defRPr sz="1300" b="1">
                 <a:solidFill>
                   <a:srgbClr val="008000"/>
                 </a:solidFill>
@@ -8904,8 +8904,8 @@
         </p:nvSpPr>
         <p:spPr>
           <a:xfrm>
-            <a:off x="457200" y="4023360"/>
-            <a:ext cx="10972800" cy="502920"/>
+            <a:off x="457200" y="4480560"/>
+            <a:ext cx="11247120" cy="594360"/>
           </a:xfrm>
           <a:prstGeom prst="rect">
             <a:avLst/>
@@ -8947,8 +8947,8 @@
         </p:nvSpPr>
         <p:spPr>
           <a:xfrm>
-            <a:off x="548640" y="4096512"/>
-            <a:ext cx="411480" cy="320040"/>
+            <a:off x="640080" y="4572000"/>
+            <a:ext cx="502920" cy="384048"/>
           </a:xfrm>
           <a:prstGeom prst="rect">
             <a:avLst/>
@@ -8990,8 +8990,8 @@
         </p:nvSpPr>
         <p:spPr>
           <a:xfrm>
-            <a:off x="548640" y="4114800"/>
-            <a:ext cx="411480" cy="274320"/>
+            <a:off x="640080" y="4590288"/>
+            <a:ext cx="502920" cy="347472"/>
           </a:xfrm>
           <a:prstGeom prst="rect">
             <a:avLst/>
@@ -9005,7 +9005,7 @@
           <a:lstStyle/>
           <a:p>
             <a:pPr algn="ctr">
-              <a:defRPr sz="900" b="1">
+              <a:defRPr sz="1100" b="1">
                 <a:solidFill>
                   <a:srgbClr val="FFFFFF"/>
                 </a:solidFill>
@@ -9026,22 +9026,22 @@
         </p:nvSpPr>
         <p:spPr>
           <a:xfrm>
-            <a:off x="1097280" y="4114800"/>
-            <a:ext cx="3200400" cy="274320"/>
-          </a:xfrm>
-          <a:prstGeom prst="rect">
-            <a:avLst/>
-          </a:prstGeom>
-          <a:noFill/>
-        </p:spPr>
-        <p:txBody>
-          <a:bodyPr wrap="square">
-            <a:spAutoFit/>
-          </a:bodyPr>
-          <a:lstStyle/>
-          <a:p>
-            <a:pPr algn="l">
-              <a:defRPr sz="1200" b="1">
+            <a:off x="1371600" y="4590288"/>
+            <a:ext cx="4114800" cy="347472"/>
+          </a:xfrm>
+          <a:prstGeom prst="rect">
+            <a:avLst/>
+          </a:prstGeom>
+          <a:noFill/>
+        </p:spPr>
+        <p:txBody>
+          <a:bodyPr wrap="square">
+            <a:spAutoFit/>
+          </a:bodyPr>
+          <a:lstStyle/>
+          <a:p>
+            <a:pPr algn="l">
+              <a:defRPr sz="1400" b="1">
                 <a:solidFill>
                   <a:srgbClr val="333333"/>
                 </a:solidFill>
@@ -9062,22 +9062,22 @@
         </p:nvSpPr>
         <p:spPr>
           <a:xfrm>
-            <a:off x="4572000" y="4114800"/>
-            <a:ext cx="1371600" cy="274320"/>
-          </a:xfrm>
-          <a:prstGeom prst="rect">
-            <a:avLst/>
-          </a:prstGeom>
-          <a:noFill/>
-        </p:spPr>
-        <p:txBody>
-          <a:bodyPr wrap="square">
-            <a:spAutoFit/>
-          </a:bodyPr>
-          <a:lstStyle/>
-          <a:p>
-            <a:pPr algn="l">
-              <a:defRPr sz="1100" b="0">
+            <a:off x="5669280" y="4590288"/>
+            <a:ext cx="2286000" cy="347472"/>
+          </a:xfrm>
+          <a:prstGeom prst="rect">
+            <a:avLst/>
+          </a:prstGeom>
+          <a:noFill/>
+        </p:spPr>
+        <p:txBody>
+          <a:bodyPr wrap="square">
+            <a:spAutoFit/>
+          </a:bodyPr>
+          <a:lstStyle/>
+          <a:p>
+            <a:pPr algn="l">
+              <a:defRPr sz="1300" b="0">
                 <a:solidFill>
                   <a:srgbClr val="333333"/>
                 </a:solidFill>
@@ -9098,22 +9098,22 @@
         </p:nvSpPr>
         <p:spPr>
           <a:xfrm>
-            <a:off x="6217920" y="4114800"/>
-            <a:ext cx="1371600" cy="274320"/>
-          </a:xfrm>
-          <a:prstGeom prst="rect">
-            <a:avLst/>
-          </a:prstGeom>
-          <a:noFill/>
-        </p:spPr>
-        <p:txBody>
-          <a:bodyPr wrap="square">
-            <a:spAutoFit/>
-          </a:bodyPr>
-          <a:lstStyle/>
-          <a:p>
-            <a:pPr algn="l">
-              <a:defRPr sz="1100" b="0">
+            <a:off x="8229600" y="4590288"/>
+            <a:ext cx="2743200" cy="347472"/>
+          </a:xfrm>
+          <a:prstGeom prst="rect">
+            <a:avLst/>
+          </a:prstGeom>
+          <a:noFill/>
+        </p:spPr>
+        <p:txBody>
+          <a:bodyPr wrap="square">
+            <a:spAutoFit/>
+          </a:bodyPr>
+          <a:lstStyle/>
+          <a:p>
+            <a:pPr algn="l">
+              <a:defRPr sz="1300" b="1">
                 <a:solidFill>
                   <a:srgbClr val="808080"/>
                 </a:solidFill>
@@ -9134,8 +9134,8 @@
         </p:nvSpPr>
         <p:spPr>
           <a:xfrm>
-            <a:off x="457200" y="4572000"/>
-            <a:ext cx="10972800" cy="502920"/>
+            <a:off x="457200" y="5120640"/>
+            <a:ext cx="11247120" cy="594360"/>
           </a:xfrm>
           <a:prstGeom prst="rect">
             <a:avLst/>
@@ -9177,8 +9177,8 @@
         </p:nvSpPr>
         <p:spPr>
           <a:xfrm>
-            <a:off x="548640" y="4645152"/>
-            <a:ext cx="411480" cy="320040"/>
+            <a:off x="640080" y="5212080"/>
+            <a:ext cx="502920" cy="384048"/>
           </a:xfrm>
           <a:prstGeom prst="rect">
             <a:avLst/>
@@ -9220,8 +9220,8 @@
         </p:nvSpPr>
         <p:spPr>
           <a:xfrm>
-            <a:off x="548640" y="4663440"/>
-            <a:ext cx="411480" cy="274320"/>
+            <a:off x="640080" y="5230368"/>
+            <a:ext cx="502920" cy="347472"/>
           </a:xfrm>
           <a:prstGeom prst="rect">
             <a:avLst/>
@@ -9235,7 +9235,7 @@
           <a:lstStyle/>
           <a:p>
             <a:pPr algn="ctr">
-              <a:defRPr sz="900" b="1">
+              <a:defRPr sz="1100" b="1">
                 <a:solidFill>
                   <a:srgbClr val="FFFFFF"/>
                 </a:solidFill>
@@ -9256,22 +9256,22 @@
         </p:nvSpPr>
         <p:spPr>
           <a:xfrm>
-            <a:off x="1097280" y="4663440"/>
-            <a:ext cx="3200400" cy="274320"/>
-          </a:xfrm>
-          <a:prstGeom prst="rect">
-            <a:avLst/>
-          </a:prstGeom>
-          <a:noFill/>
-        </p:spPr>
-        <p:txBody>
-          <a:bodyPr wrap="square">
-            <a:spAutoFit/>
-          </a:bodyPr>
-          <a:lstStyle/>
-          <a:p>
-            <a:pPr algn="l">
-              <a:defRPr sz="1200" b="1">
+            <a:off x="1371600" y="5230368"/>
+            <a:ext cx="4114800" cy="347472"/>
+          </a:xfrm>
+          <a:prstGeom prst="rect">
+            <a:avLst/>
+          </a:prstGeom>
+          <a:noFill/>
+        </p:spPr>
+        <p:txBody>
+          <a:bodyPr wrap="square">
+            <a:spAutoFit/>
+          </a:bodyPr>
+          <a:lstStyle/>
+          <a:p>
+            <a:pPr algn="l">
+              <a:defRPr sz="1400" b="1">
                 <a:solidFill>
                   <a:srgbClr val="333333"/>
                 </a:solidFill>
@@ -9292,22 +9292,22 @@
         </p:nvSpPr>
         <p:spPr>
           <a:xfrm>
-            <a:off x="4572000" y="4663440"/>
-            <a:ext cx="1371600" cy="274320"/>
-          </a:xfrm>
-          <a:prstGeom prst="rect">
-            <a:avLst/>
-          </a:prstGeom>
-          <a:noFill/>
-        </p:spPr>
-        <p:txBody>
-          <a:bodyPr wrap="square">
-            <a:spAutoFit/>
-          </a:bodyPr>
-          <a:lstStyle/>
-          <a:p>
-            <a:pPr algn="l">
-              <a:defRPr sz="1100" b="0">
+            <a:off x="5669280" y="5230368"/>
+            <a:ext cx="2286000" cy="347472"/>
+          </a:xfrm>
+          <a:prstGeom prst="rect">
+            <a:avLst/>
+          </a:prstGeom>
+          <a:noFill/>
+        </p:spPr>
+        <p:txBody>
+          <a:bodyPr wrap="square">
+            <a:spAutoFit/>
+          </a:bodyPr>
+          <a:lstStyle/>
+          <a:p>
+            <a:pPr algn="l">
+              <a:defRPr sz="1300" b="0">
                 <a:solidFill>
                   <a:srgbClr val="333333"/>
                 </a:solidFill>
@@ -9328,22 +9328,22 @@
         </p:nvSpPr>
         <p:spPr>
           <a:xfrm>
-            <a:off x="6217920" y="4663440"/>
-            <a:ext cx="1371600" cy="274320"/>
-          </a:xfrm>
-          <a:prstGeom prst="rect">
-            <a:avLst/>
-          </a:prstGeom>
-          <a:noFill/>
-        </p:spPr>
-        <p:txBody>
-          <a:bodyPr wrap="square">
-            <a:spAutoFit/>
-          </a:bodyPr>
-          <a:lstStyle/>
-          <a:p>
-            <a:pPr algn="l">
-              <a:defRPr sz="1100" b="0">
+            <a:off x="8229600" y="5230368"/>
+            <a:ext cx="2743200" cy="347472"/>
+          </a:xfrm>
+          <a:prstGeom prst="rect">
+            <a:avLst/>
+          </a:prstGeom>
+          <a:noFill/>
+        </p:spPr>
+        <p:txBody>
+          <a:bodyPr wrap="square">
+            <a:spAutoFit/>
+          </a:bodyPr>
+          <a:lstStyle/>
+          <a:p>
+            <a:pPr algn="l">
+              <a:defRPr sz="1300" b="1">
                 <a:solidFill>
                   <a:srgbClr val="808080"/>
                 </a:solidFill>
@@ -10040,7 +10040,7 @@
         <p:spPr>
           <a:xfrm>
             <a:off x="457200" y="1280160"/>
-            <a:ext cx="365760" cy="365760"/>
+            <a:ext cx="411480" cy="411480"/>
           </a:xfrm>
           <a:prstGeom prst="ellipse">
             <a:avLst/>
@@ -10082,8 +10082,8 @@
         </p:nvSpPr>
         <p:spPr>
           <a:xfrm>
-            <a:off x="457200" y="1325880"/>
-            <a:ext cx="365760" cy="274320"/>
+            <a:off x="457200" y="1335024"/>
+            <a:ext cx="411480" cy="320040"/>
           </a:xfrm>
           <a:prstGeom prst="rect">
             <a:avLst/>
@@ -10097,7 +10097,7 @@
           <a:lstStyle/>
           <a:p>
             <a:pPr algn="ctr">
-              <a:defRPr sz="1000" b="1">
+              <a:defRPr sz="1200" b="1">
                 <a:solidFill>
                   <a:srgbClr val="FFFFFF"/>
                 </a:solidFill>
@@ -10118,22 +10118,22 @@
         </p:nvSpPr>
         <p:spPr>
           <a:xfrm>
-            <a:off x="1005840" y="1325880"/>
-            <a:ext cx="8686800" cy="274320"/>
-          </a:xfrm>
-          <a:prstGeom prst="rect">
-            <a:avLst/>
-          </a:prstGeom>
-          <a:noFill/>
-        </p:spPr>
-        <p:txBody>
-          <a:bodyPr wrap="square">
-            <a:spAutoFit/>
-          </a:bodyPr>
-          <a:lstStyle/>
-          <a:p>
-            <a:pPr algn="l">
-              <a:defRPr sz="1100" b="0">
+            <a:off x="1097280" y="1335024"/>
+            <a:ext cx="8686800" cy="320040"/>
+          </a:xfrm>
+          <a:prstGeom prst="rect">
+            <a:avLst/>
+          </a:prstGeom>
+          <a:noFill/>
+        </p:spPr>
+        <p:txBody>
+          <a:bodyPr wrap="square">
+            <a:spAutoFit/>
+          </a:bodyPr>
+          <a:lstStyle/>
+          <a:p>
+            <a:pPr algn="l">
+              <a:defRPr sz="1300" b="0">
                 <a:solidFill>
                   <a:srgbClr val="333333"/>
                 </a:solidFill>
@@ -10154,22 +10154,22 @@
         </p:nvSpPr>
         <p:spPr>
           <a:xfrm>
-            <a:off x="10058400" y="1325880"/>
-            <a:ext cx="1371600" cy="274320"/>
-          </a:xfrm>
-          <a:prstGeom prst="rect">
-            <a:avLst/>
-          </a:prstGeom>
-          <a:noFill/>
-        </p:spPr>
-        <p:txBody>
-          <a:bodyPr wrap="square">
-            <a:spAutoFit/>
-          </a:bodyPr>
-          <a:lstStyle/>
-          <a:p>
-            <a:pPr algn="l">
-              <a:defRPr sz="1000" b="1">
+            <a:off x="10058400" y="1335024"/>
+            <a:ext cx="1828800" cy="320040"/>
+          </a:xfrm>
+          <a:prstGeom prst="rect">
+            <a:avLst/>
+          </a:prstGeom>
+          <a:noFill/>
+        </p:spPr>
+        <p:txBody>
+          <a:bodyPr wrap="square">
+            <a:spAutoFit/>
+          </a:bodyPr>
+          <a:lstStyle/>
+          <a:p>
+            <a:pPr algn="l">
+              <a:defRPr sz="1200" b="1">
                 <a:solidFill>
                   <a:srgbClr val="C80000"/>
                 </a:solidFill>
@@ -10190,8 +10190,8 @@
         </p:nvSpPr>
         <p:spPr>
           <a:xfrm>
-            <a:off x="457200" y="1737360"/>
-            <a:ext cx="365760" cy="365760"/>
+            <a:off x="457200" y="1810512"/>
+            <a:ext cx="411480" cy="411480"/>
           </a:xfrm>
           <a:prstGeom prst="ellipse">
             <a:avLst/>
@@ -10233,8 +10233,8 @@
         </p:nvSpPr>
         <p:spPr>
           <a:xfrm>
-            <a:off x="457200" y="1783080"/>
-            <a:ext cx="365760" cy="274320"/>
+            <a:off x="457200" y="1865376"/>
+            <a:ext cx="411480" cy="320040"/>
           </a:xfrm>
           <a:prstGeom prst="rect">
             <a:avLst/>
@@ -10248,7 +10248,7 @@
           <a:lstStyle/>
           <a:p>
             <a:pPr algn="ctr">
-              <a:defRPr sz="1000" b="1">
+              <a:defRPr sz="1200" b="1">
                 <a:solidFill>
                   <a:srgbClr val="FFFFFF"/>
                 </a:solidFill>
@@ -10269,22 +10269,22 @@
         </p:nvSpPr>
         <p:spPr>
           <a:xfrm>
-            <a:off x="1005840" y="1783080"/>
-            <a:ext cx="8686800" cy="274320"/>
-          </a:xfrm>
-          <a:prstGeom prst="rect">
-            <a:avLst/>
-          </a:prstGeom>
-          <a:noFill/>
-        </p:spPr>
-        <p:txBody>
-          <a:bodyPr wrap="square">
-            <a:spAutoFit/>
-          </a:bodyPr>
-          <a:lstStyle/>
-          <a:p>
-            <a:pPr algn="l">
-              <a:defRPr sz="1100" b="0">
+            <a:off x="1097280" y="1865376"/>
+            <a:ext cx="8686800" cy="320040"/>
+          </a:xfrm>
+          <a:prstGeom prst="rect">
+            <a:avLst/>
+          </a:prstGeom>
+          <a:noFill/>
+        </p:spPr>
+        <p:txBody>
+          <a:bodyPr wrap="square">
+            <a:spAutoFit/>
+          </a:bodyPr>
+          <a:lstStyle/>
+          <a:p>
+            <a:pPr algn="l">
+              <a:defRPr sz="1300" b="0">
                 <a:solidFill>
                   <a:srgbClr val="333333"/>
                 </a:solidFill>
@@ -10305,22 +10305,22 @@
         </p:nvSpPr>
         <p:spPr>
           <a:xfrm>
-            <a:off x="10058400" y="1783080"/>
-            <a:ext cx="1371600" cy="274320"/>
-          </a:xfrm>
-          <a:prstGeom prst="rect">
-            <a:avLst/>
-          </a:prstGeom>
-          <a:noFill/>
-        </p:spPr>
-        <p:txBody>
-          <a:bodyPr wrap="square">
-            <a:spAutoFit/>
-          </a:bodyPr>
-          <a:lstStyle/>
-          <a:p>
-            <a:pPr algn="l">
-              <a:defRPr sz="1000" b="1">
+            <a:off x="10058400" y="1865376"/>
+            <a:ext cx="1828800" cy="320040"/>
+          </a:xfrm>
+          <a:prstGeom prst="rect">
+            <a:avLst/>
+          </a:prstGeom>
+          <a:noFill/>
+        </p:spPr>
+        <p:txBody>
+          <a:bodyPr wrap="square">
+            <a:spAutoFit/>
+          </a:bodyPr>
+          <a:lstStyle/>
+          <a:p>
+            <a:pPr algn="l">
+              <a:defRPr sz="1200" b="1">
                 <a:solidFill>
                   <a:srgbClr val="C80000"/>
                 </a:solidFill>
@@ -10341,8 +10341,8 @@
         </p:nvSpPr>
         <p:spPr>
           <a:xfrm>
-            <a:off x="457200" y="2194560"/>
-            <a:ext cx="365760" cy="365760"/>
+            <a:off x="457200" y="2340864"/>
+            <a:ext cx="411480" cy="411480"/>
           </a:xfrm>
           <a:prstGeom prst="ellipse">
             <a:avLst/>
@@ -10384,8 +10384,8 @@
         </p:nvSpPr>
         <p:spPr>
           <a:xfrm>
-            <a:off x="457200" y="2240280"/>
-            <a:ext cx="365760" cy="274320"/>
+            <a:off x="457200" y="2395728"/>
+            <a:ext cx="411480" cy="320040"/>
           </a:xfrm>
           <a:prstGeom prst="rect">
             <a:avLst/>
@@ -10399,7 +10399,7 @@
           <a:lstStyle/>
           <a:p>
             <a:pPr algn="ctr">
-              <a:defRPr sz="1000" b="1">
+              <a:defRPr sz="1200" b="1">
                 <a:solidFill>
                   <a:srgbClr val="FFFFFF"/>
                 </a:solidFill>
@@ -10420,22 +10420,22 @@
         </p:nvSpPr>
         <p:spPr>
           <a:xfrm>
-            <a:off x="1005840" y="2240280"/>
-            <a:ext cx="8686800" cy="274320"/>
-          </a:xfrm>
-          <a:prstGeom prst="rect">
-            <a:avLst/>
-          </a:prstGeom>
-          <a:noFill/>
-        </p:spPr>
-        <p:txBody>
-          <a:bodyPr wrap="square">
-            <a:spAutoFit/>
-          </a:bodyPr>
-          <a:lstStyle/>
-          <a:p>
-            <a:pPr algn="l">
-              <a:defRPr sz="1100" b="0">
+            <a:off x="1097280" y="2395728"/>
+            <a:ext cx="8686800" cy="320040"/>
+          </a:xfrm>
+          <a:prstGeom prst="rect">
+            <a:avLst/>
+          </a:prstGeom>
+          <a:noFill/>
+        </p:spPr>
+        <p:txBody>
+          <a:bodyPr wrap="square">
+            <a:spAutoFit/>
+          </a:bodyPr>
+          <a:lstStyle/>
+          <a:p>
+            <a:pPr algn="l">
+              <a:defRPr sz="1300" b="0">
                 <a:solidFill>
                   <a:srgbClr val="333333"/>
                 </a:solidFill>
@@ -10456,22 +10456,22 @@
         </p:nvSpPr>
         <p:spPr>
           <a:xfrm>
-            <a:off x="10058400" y="2240280"/>
-            <a:ext cx="1371600" cy="274320"/>
-          </a:xfrm>
-          <a:prstGeom prst="rect">
-            <a:avLst/>
-          </a:prstGeom>
-          <a:noFill/>
-        </p:spPr>
-        <p:txBody>
-          <a:bodyPr wrap="square">
-            <a:spAutoFit/>
-          </a:bodyPr>
-          <a:lstStyle/>
-          <a:p>
-            <a:pPr algn="l">
-              <a:defRPr sz="1000" b="1">
+            <a:off x="10058400" y="2395728"/>
+            <a:ext cx="1828800" cy="320040"/>
+          </a:xfrm>
+          <a:prstGeom prst="rect">
+            <a:avLst/>
+          </a:prstGeom>
+          <a:noFill/>
+        </p:spPr>
+        <p:txBody>
+          <a:bodyPr wrap="square">
+            <a:spAutoFit/>
+          </a:bodyPr>
+          <a:lstStyle/>
+          <a:p>
+            <a:pPr algn="l">
+              <a:defRPr sz="1200" b="1">
                 <a:solidFill>
                   <a:srgbClr val="C80000"/>
                 </a:solidFill>
@@ -10492,8 +10492,8 @@
         </p:nvSpPr>
         <p:spPr>
           <a:xfrm>
-            <a:off x="457200" y="2651760"/>
-            <a:ext cx="365760" cy="365760"/>
+            <a:off x="457200" y="2871216"/>
+            <a:ext cx="411480" cy="411480"/>
           </a:xfrm>
           <a:prstGeom prst="ellipse">
             <a:avLst/>
@@ -10535,8 +10535,8 @@
         </p:nvSpPr>
         <p:spPr>
           <a:xfrm>
-            <a:off x="457200" y="2697480"/>
-            <a:ext cx="365760" cy="274320"/>
+            <a:off x="457200" y="2926080"/>
+            <a:ext cx="411480" cy="320040"/>
           </a:xfrm>
           <a:prstGeom prst="rect">
             <a:avLst/>
@@ -10550,7 +10550,7 @@
           <a:lstStyle/>
           <a:p>
             <a:pPr algn="ctr">
-              <a:defRPr sz="1000" b="1">
+              <a:defRPr sz="1200" b="1">
                 <a:solidFill>
                   <a:srgbClr val="FFFFFF"/>
                 </a:solidFill>
@@ -10571,22 +10571,22 @@
         </p:nvSpPr>
         <p:spPr>
           <a:xfrm>
-            <a:off x="1005840" y="2697480"/>
-            <a:ext cx="8686800" cy="274320"/>
-          </a:xfrm>
-          <a:prstGeom prst="rect">
-            <a:avLst/>
-          </a:prstGeom>
-          <a:noFill/>
-        </p:spPr>
-        <p:txBody>
-          <a:bodyPr wrap="square">
-            <a:spAutoFit/>
-          </a:bodyPr>
-          <a:lstStyle/>
-          <a:p>
-            <a:pPr algn="l">
-              <a:defRPr sz="1100" b="0">
+            <a:off x="1097280" y="2926080"/>
+            <a:ext cx="8686800" cy="320040"/>
+          </a:xfrm>
+          <a:prstGeom prst="rect">
+            <a:avLst/>
+          </a:prstGeom>
+          <a:noFill/>
+        </p:spPr>
+        <p:txBody>
+          <a:bodyPr wrap="square">
+            <a:spAutoFit/>
+          </a:bodyPr>
+          <a:lstStyle/>
+          <a:p>
+            <a:pPr algn="l">
+              <a:defRPr sz="1300" b="0">
                 <a:solidFill>
                   <a:srgbClr val="333333"/>
                 </a:solidFill>
@@ -10607,22 +10607,22 @@
         </p:nvSpPr>
         <p:spPr>
           <a:xfrm>
-            <a:off x="10058400" y="2697480"/>
-            <a:ext cx="1371600" cy="274320"/>
-          </a:xfrm>
-          <a:prstGeom prst="rect">
-            <a:avLst/>
-          </a:prstGeom>
-          <a:noFill/>
-        </p:spPr>
-        <p:txBody>
-          <a:bodyPr wrap="square">
-            <a:spAutoFit/>
-          </a:bodyPr>
-          <a:lstStyle/>
-          <a:p>
-            <a:pPr algn="l">
-              <a:defRPr sz="1000" b="1">
+            <a:off x="10058400" y="2926080"/>
+            <a:ext cx="1828800" cy="320040"/>
+          </a:xfrm>
+          <a:prstGeom prst="rect">
+            <a:avLst/>
+          </a:prstGeom>
+          <a:noFill/>
+        </p:spPr>
+        <p:txBody>
+          <a:bodyPr wrap="square">
+            <a:spAutoFit/>
+          </a:bodyPr>
+          <a:lstStyle/>
+          <a:p>
+            <a:pPr algn="l">
+              <a:defRPr sz="1200" b="1">
                 <a:solidFill>
                   <a:srgbClr val="C80000"/>
                 </a:solidFill>
@@ -10643,8 +10643,8 @@
         </p:nvSpPr>
         <p:spPr>
           <a:xfrm>
-            <a:off x="457200" y="3108960"/>
-            <a:ext cx="365760" cy="365760"/>
+            <a:off x="457200" y="3401568"/>
+            <a:ext cx="411480" cy="411480"/>
           </a:xfrm>
           <a:prstGeom prst="ellipse">
             <a:avLst/>
@@ -10686,8 +10686,8 @@
         </p:nvSpPr>
         <p:spPr>
           <a:xfrm>
-            <a:off x="457200" y="3154680"/>
-            <a:ext cx="365760" cy="274320"/>
+            <a:off x="457200" y="3456432"/>
+            <a:ext cx="411480" cy="320040"/>
           </a:xfrm>
           <a:prstGeom prst="rect">
             <a:avLst/>
@@ -10701,7 +10701,7 @@
           <a:lstStyle/>
           <a:p>
             <a:pPr algn="ctr">
-              <a:defRPr sz="1000" b="1">
+              <a:defRPr sz="1200" b="1">
                 <a:solidFill>
                   <a:srgbClr val="FFFFFF"/>
                 </a:solidFill>
@@ -10722,22 +10722,22 @@
         </p:nvSpPr>
         <p:spPr>
           <a:xfrm>
-            <a:off x="1005840" y="3154680"/>
-            <a:ext cx="8686800" cy="274320"/>
-          </a:xfrm>
-          <a:prstGeom prst="rect">
-            <a:avLst/>
-          </a:prstGeom>
-          <a:noFill/>
-        </p:spPr>
-        <p:txBody>
-          <a:bodyPr wrap="square">
-            <a:spAutoFit/>
-          </a:bodyPr>
-          <a:lstStyle/>
-          <a:p>
-            <a:pPr algn="l">
-              <a:defRPr sz="1100" b="0">
+            <a:off x="1097280" y="3456432"/>
+            <a:ext cx="8686800" cy="320040"/>
+          </a:xfrm>
+          <a:prstGeom prst="rect">
+            <a:avLst/>
+          </a:prstGeom>
+          <a:noFill/>
+        </p:spPr>
+        <p:txBody>
+          <a:bodyPr wrap="square">
+            <a:spAutoFit/>
+          </a:bodyPr>
+          <a:lstStyle/>
+          <a:p>
+            <a:pPr algn="l">
+              <a:defRPr sz="1300" b="0">
                 <a:solidFill>
                   <a:srgbClr val="333333"/>
                 </a:solidFill>
@@ -10758,22 +10758,22 @@
         </p:nvSpPr>
         <p:spPr>
           <a:xfrm>
-            <a:off x="10058400" y="3154680"/>
-            <a:ext cx="1371600" cy="274320"/>
-          </a:xfrm>
-          <a:prstGeom prst="rect">
-            <a:avLst/>
-          </a:prstGeom>
-          <a:noFill/>
-        </p:spPr>
-        <p:txBody>
-          <a:bodyPr wrap="square">
-            <a:spAutoFit/>
-          </a:bodyPr>
-          <a:lstStyle/>
-          <a:p>
-            <a:pPr algn="l">
-              <a:defRPr sz="1000" b="1">
+            <a:off x="10058400" y="3456432"/>
+            <a:ext cx="1828800" cy="320040"/>
+          </a:xfrm>
+          <a:prstGeom prst="rect">
+            <a:avLst/>
+          </a:prstGeom>
+          <a:noFill/>
+        </p:spPr>
+        <p:txBody>
+          <a:bodyPr wrap="square">
+            <a:spAutoFit/>
+          </a:bodyPr>
+          <a:lstStyle/>
+          <a:p>
+            <a:pPr algn="l">
+              <a:defRPr sz="1200" b="1">
                 <a:solidFill>
                   <a:srgbClr val="C80000"/>
                 </a:solidFill>
@@ -10794,8 +10794,8 @@
         </p:nvSpPr>
         <p:spPr>
           <a:xfrm>
-            <a:off x="457200" y="3566160"/>
-            <a:ext cx="365760" cy="365760"/>
+            <a:off x="457200" y="3931920"/>
+            <a:ext cx="411480" cy="411480"/>
           </a:xfrm>
           <a:prstGeom prst="ellipse">
             <a:avLst/>
@@ -10837,8 +10837,8 @@
         </p:nvSpPr>
         <p:spPr>
           <a:xfrm>
-            <a:off x="457200" y="3611880"/>
-            <a:ext cx="365760" cy="274320"/>
+            <a:off x="457200" y="3986784"/>
+            <a:ext cx="411480" cy="320040"/>
           </a:xfrm>
           <a:prstGeom prst="rect">
             <a:avLst/>
@@ -10852,7 +10852,7 @@
           <a:lstStyle/>
           <a:p>
             <a:pPr algn="ctr">
-              <a:defRPr sz="1000" b="1">
+              <a:defRPr sz="1200" b="1">
                 <a:solidFill>
                   <a:srgbClr val="FFFFFF"/>
                 </a:solidFill>
@@ -10873,22 +10873,22 @@
         </p:nvSpPr>
         <p:spPr>
           <a:xfrm>
-            <a:off x="1005840" y="3611880"/>
-            <a:ext cx="8686800" cy="274320"/>
-          </a:xfrm>
-          <a:prstGeom prst="rect">
-            <a:avLst/>
-          </a:prstGeom>
-          <a:noFill/>
-        </p:spPr>
-        <p:txBody>
-          <a:bodyPr wrap="square">
-            <a:spAutoFit/>
-          </a:bodyPr>
-          <a:lstStyle/>
-          <a:p>
-            <a:pPr algn="l">
-              <a:defRPr sz="1100" b="0">
+            <a:off x="1097280" y="3986784"/>
+            <a:ext cx="8686800" cy="320040"/>
+          </a:xfrm>
+          <a:prstGeom prst="rect">
+            <a:avLst/>
+          </a:prstGeom>
+          <a:noFill/>
+        </p:spPr>
+        <p:txBody>
+          <a:bodyPr wrap="square">
+            <a:spAutoFit/>
+          </a:bodyPr>
+          <a:lstStyle/>
+          <a:p>
+            <a:pPr algn="l">
+              <a:defRPr sz="1300" b="0">
                 <a:solidFill>
                   <a:srgbClr val="333333"/>
                 </a:solidFill>
@@ -10909,22 +10909,22 @@
         </p:nvSpPr>
         <p:spPr>
           <a:xfrm>
-            <a:off x="10058400" y="3611880"/>
-            <a:ext cx="1371600" cy="274320"/>
-          </a:xfrm>
-          <a:prstGeom prst="rect">
-            <a:avLst/>
-          </a:prstGeom>
-          <a:noFill/>
-        </p:spPr>
-        <p:txBody>
-          <a:bodyPr wrap="square">
-            <a:spAutoFit/>
-          </a:bodyPr>
-          <a:lstStyle/>
-          <a:p>
-            <a:pPr algn="l">
-              <a:defRPr sz="1000" b="1">
+            <a:off x="10058400" y="3986784"/>
+            <a:ext cx="1828800" cy="320040"/>
+          </a:xfrm>
+          <a:prstGeom prst="rect">
+            <a:avLst/>
+          </a:prstGeom>
+          <a:noFill/>
+        </p:spPr>
+        <p:txBody>
+          <a:bodyPr wrap="square">
+            <a:spAutoFit/>
+          </a:bodyPr>
+          <a:lstStyle/>
+          <a:p>
+            <a:pPr algn="l">
+              <a:defRPr sz="1200" b="1">
                 <a:solidFill>
                   <a:srgbClr val="C80000"/>
                 </a:solidFill>
@@ -10945,8 +10945,8 @@
         </p:nvSpPr>
         <p:spPr>
           <a:xfrm>
-            <a:off x="457200" y="4023360"/>
-            <a:ext cx="365760" cy="365760"/>
+            <a:off x="457200" y="4462272"/>
+            <a:ext cx="411480" cy="411480"/>
           </a:xfrm>
           <a:prstGeom prst="ellipse">
             <a:avLst/>
@@ -10988,8 +10988,8 @@
         </p:nvSpPr>
         <p:spPr>
           <a:xfrm>
-            <a:off x="457200" y="4069080"/>
-            <a:ext cx="365760" cy="274320"/>
+            <a:off x="457200" y="4517136"/>
+            <a:ext cx="411480" cy="320040"/>
           </a:xfrm>
           <a:prstGeom prst="rect">
             <a:avLst/>
@@ -11003,7 +11003,7 @@
           <a:lstStyle/>
           <a:p>
             <a:pPr algn="ctr">
-              <a:defRPr sz="1000" b="1">
+              <a:defRPr sz="1200" b="1">
                 <a:solidFill>
                   <a:srgbClr val="FFFFFF"/>
                 </a:solidFill>
@@ -11024,22 +11024,22 @@
         </p:nvSpPr>
         <p:spPr>
           <a:xfrm>
-            <a:off x="1005840" y="4069080"/>
-            <a:ext cx="8686800" cy="274320"/>
-          </a:xfrm>
-          <a:prstGeom prst="rect">
-            <a:avLst/>
-          </a:prstGeom>
-          <a:noFill/>
-        </p:spPr>
-        <p:txBody>
-          <a:bodyPr wrap="square">
-            <a:spAutoFit/>
-          </a:bodyPr>
-          <a:lstStyle/>
-          <a:p>
-            <a:pPr algn="l">
-              <a:defRPr sz="1100" b="0">
+            <a:off x="1097280" y="4517136"/>
+            <a:ext cx="8686800" cy="320040"/>
+          </a:xfrm>
+          <a:prstGeom prst="rect">
+            <a:avLst/>
+          </a:prstGeom>
+          <a:noFill/>
+        </p:spPr>
+        <p:txBody>
+          <a:bodyPr wrap="square">
+            <a:spAutoFit/>
+          </a:bodyPr>
+          <a:lstStyle/>
+          <a:p>
+            <a:pPr algn="l">
+              <a:defRPr sz="1300" b="0">
                 <a:solidFill>
                   <a:srgbClr val="333333"/>
                 </a:solidFill>
@@ -11060,22 +11060,22 @@
         </p:nvSpPr>
         <p:spPr>
           <a:xfrm>
-            <a:off x="10058400" y="4069080"/>
-            <a:ext cx="1371600" cy="274320"/>
-          </a:xfrm>
-          <a:prstGeom prst="rect">
-            <a:avLst/>
-          </a:prstGeom>
-          <a:noFill/>
-        </p:spPr>
-        <p:txBody>
-          <a:bodyPr wrap="square">
-            <a:spAutoFit/>
-          </a:bodyPr>
-          <a:lstStyle/>
-          <a:p>
-            <a:pPr algn="l">
-              <a:defRPr sz="1000" b="1">
+            <a:off x="10058400" y="4517136"/>
+            <a:ext cx="1828800" cy="320040"/>
+          </a:xfrm>
+          <a:prstGeom prst="rect">
+            <a:avLst/>
+          </a:prstGeom>
+          <a:noFill/>
+        </p:spPr>
+        <p:txBody>
+          <a:bodyPr wrap="square">
+            <a:spAutoFit/>
+          </a:bodyPr>
+          <a:lstStyle/>
+          <a:p>
+            <a:pPr algn="l">
+              <a:defRPr sz="1200" b="1">
                 <a:solidFill>
                   <a:srgbClr val="FFA500"/>
                 </a:solidFill>
@@ -11096,8 +11096,8 @@
         </p:nvSpPr>
         <p:spPr>
           <a:xfrm>
-            <a:off x="457200" y="4480560"/>
-            <a:ext cx="365760" cy="365760"/>
+            <a:off x="457200" y="4992624"/>
+            <a:ext cx="411480" cy="411480"/>
           </a:xfrm>
           <a:prstGeom prst="ellipse">
             <a:avLst/>
@@ -11139,8 +11139,8 @@
         </p:nvSpPr>
         <p:spPr>
           <a:xfrm>
-            <a:off x="457200" y="4526280"/>
-            <a:ext cx="365760" cy="274320"/>
+            <a:off x="457200" y="5047488"/>
+            <a:ext cx="411480" cy="320040"/>
           </a:xfrm>
           <a:prstGeom prst="rect">
             <a:avLst/>
@@ -11154,7 +11154,7 @@
           <a:lstStyle/>
           <a:p>
             <a:pPr algn="ctr">
-              <a:defRPr sz="1000" b="1">
+              <a:defRPr sz="1200" b="1">
                 <a:solidFill>
                   <a:srgbClr val="FFFFFF"/>
                 </a:solidFill>
@@ -11175,22 +11175,22 @@
         </p:nvSpPr>
         <p:spPr>
           <a:xfrm>
-            <a:off x="1005840" y="4526280"/>
-            <a:ext cx="8686800" cy="274320"/>
-          </a:xfrm>
-          <a:prstGeom prst="rect">
-            <a:avLst/>
-          </a:prstGeom>
-          <a:noFill/>
-        </p:spPr>
-        <p:txBody>
-          <a:bodyPr wrap="square">
-            <a:spAutoFit/>
-          </a:bodyPr>
-          <a:lstStyle/>
-          <a:p>
-            <a:pPr algn="l">
-              <a:defRPr sz="1100" b="0">
+            <a:off x="1097280" y="5047488"/>
+            <a:ext cx="8686800" cy="320040"/>
+          </a:xfrm>
+          <a:prstGeom prst="rect">
+            <a:avLst/>
+          </a:prstGeom>
+          <a:noFill/>
+        </p:spPr>
+        <p:txBody>
+          <a:bodyPr wrap="square">
+            <a:spAutoFit/>
+          </a:bodyPr>
+          <a:lstStyle/>
+          <a:p>
+            <a:pPr algn="l">
+              <a:defRPr sz="1300" b="0">
                 <a:solidFill>
                   <a:srgbClr val="333333"/>
                 </a:solidFill>
@@ -11211,22 +11211,22 @@
         </p:nvSpPr>
         <p:spPr>
           <a:xfrm>
-            <a:off x="10058400" y="4526280"/>
-            <a:ext cx="1371600" cy="274320"/>
-          </a:xfrm>
-          <a:prstGeom prst="rect">
-            <a:avLst/>
-          </a:prstGeom>
-          <a:noFill/>
-        </p:spPr>
-        <p:txBody>
-          <a:bodyPr wrap="square">
-            <a:spAutoFit/>
-          </a:bodyPr>
-          <a:lstStyle/>
-          <a:p>
-            <a:pPr algn="l">
-              <a:defRPr sz="1000" b="1">
+            <a:off x="10058400" y="5047488"/>
+            <a:ext cx="1828800" cy="320040"/>
+          </a:xfrm>
+          <a:prstGeom prst="rect">
+            <a:avLst/>
+          </a:prstGeom>
+          <a:noFill/>
+        </p:spPr>
+        <p:txBody>
+          <a:bodyPr wrap="square">
+            <a:spAutoFit/>
+          </a:bodyPr>
+          <a:lstStyle/>
+          <a:p>
+            <a:pPr algn="l">
+              <a:defRPr sz="1200" b="1">
                 <a:solidFill>
                   <a:srgbClr val="FFA500"/>
                 </a:solidFill>
@@ -11247,22 +11247,22 @@
         </p:nvSpPr>
         <p:spPr>
           <a:xfrm>
-            <a:off x="457200" y="5120640"/>
-            <a:ext cx="10972800" cy="274320"/>
-          </a:xfrm>
-          <a:prstGeom prst="rect">
-            <a:avLst/>
-          </a:prstGeom>
-          <a:noFill/>
-        </p:spPr>
-        <p:txBody>
-          <a:bodyPr wrap="square">
-            <a:spAutoFit/>
-          </a:bodyPr>
-          <a:lstStyle/>
-          <a:p>
-            <a:pPr algn="l">
-              <a:defRPr sz="1200" b="1">
+            <a:off x="457200" y="5486400"/>
+            <a:ext cx="11430000" cy="320040"/>
+          </a:xfrm>
+          <a:prstGeom prst="rect">
+            <a:avLst/>
+          </a:prstGeom>
+          <a:noFill/>
+        </p:spPr>
+        <p:txBody>
+          <a:bodyPr wrap="square">
+            <a:spAutoFit/>
+          </a:bodyPr>
+          <a:lstStyle/>
+          <a:p>
+            <a:pPr algn="l">
+              <a:defRPr sz="1400" b="1">
                 <a:solidFill>
                   <a:srgbClr val="E60000"/>
                 </a:solidFill>
@@ -17028,21 +17028,21 @@
         <p:spPr>
           <a:xfrm>
             <a:off x="457200" y="2377440"/>
-            <a:ext cx="5486400" cy="274320"/>
-          </a:xfrm>
-          <a:prstGeom prst="rect">
-            <a:avLst/>
-          </a:prstGeom>
-          <a:noFill/>
-        </p:spPr>
-        <p:txBody>
-          <a:bodyPr wrap="square">
-            <a:spAutoFit/>
-          </a:bodyPr>
-          <a:lstStyle/>
-          <a:p>
-            <a:pPr algn="l">
-              <a:defRPr sz="1200" b="1">
+            <a:ext cx="5669280" cy="320040"/>
+          </a:xfrm>
+          <a:prstGeom prst="rect">
+            <a:avLst/>
+          </a:prstGeom>
+          <a:noFill/>
+        </p:spPr>
+        <p:txBody>
+          <a:bodyPr wrap="square">
+            <a:spAutoFit/>
+          </a:bodyPr>
+          <a:lstStyle/>
+          <a:p>
+            <a:pPr algn="l">
+              <a:defRPr sz="1400" b="1">
                 <a:solidFill>
                   <a:srgbClr val="E60000"/>
                 </a:solidFill>
@@ -17063,8 +17063,8 @@
         </p:nvSpPr>
         <p:spPr>
           <a:xfrm>
-            <a:off x="457200" y="2743200"/>
-            <a:ext cx="5486400" cy="2286000"/>
+            <a:off x="457200" y="2834640"/>
+            <a:ext cx="5669280" cy="2743200"/>
           </a:xfrm>
           <a:prstGeom prst="rect">
             <a:avLst/>
@@ -17081,7 +17081,7 @@
               <a:spcAft>
                 <a:spcPts val="400"/>
               </a:spcAft>
-              <a:defRPr sz="1100">
+              <a:defRPr sz="1300">
                 <a:solidFill>
                   <a:srgbClr val="333333"/>
                 </a:solidFill>
@@ -17097,7 +17097,7 @@
               <a:spcAft>
                 <a:spcPts val="400"/>
               </a:spcAft>
-              <a:defRPr sz="1100">
+              <a:defRPr sz="1300">
                 <a:solidFill>
                   <a:srgbClr val="333333"/>
                 </a:solidFill>
@@ -17113,7 +17113,7 @@
               <a:spcAft>
                 <a:spcPts val="400"/>
               </a:spcAft>
-              <a:defRPr sz="1100">
+              <a:defRPr sz="1300">
                 <a:solidFill>
                   <a:srgbClr val="333333"/>
                 </a:solidFill>
@@ -17129,7 +17129,7 @@
               <a:spcAft>
                 <a:spcPts val="400"/>
               </a:spcAft>
-              <a:defRPr sz="1100">
+              <a:defRPr sz="1300">
                 <a:solidFill>
                   <a:srgbClr val="333333"/>
                 </a:solidFill>
@@ -17145,7 +17145,7 @@
               <a:spcAft>
                 <a:spcPts val="400"/>
               </a:spcAft>
-              <a:defRPr sz="1100">
+              <a:defRPr sz="1300">
                 <a:solidFill>
                   <a:srgbClr val="333333"/>
                 </a:solidFill>
@@ -17166,22 +17166,22 @@
         </p:nvSpPr>
         <p:spPr>
           <a:xfrm>
-            <a:off x="6217920" y="2377440"/>
-            <a:ext cx="5303520" cy="274320"/>
-          </a:xfrm>
-          <a:prstGeom prst="rect">
-            <a:avLst/>
-          </a:prstGeom>
-          <a:noFill/>
-        </p:spPr>
-        <p:txBody>
-          <a:bodyPr wrap="square">
-            <a:spAutoFit/>
-          </a:bodyPr>
-          <a:lstStyle/>
-          <a:p>
-            <a:pPr algn="l">
-              <a:defRPr sz="1200" b="1">
+            <a:off x="6400800" y="2377440"/>
+            <a:ext cx="5303520" cy="320040"/>
+          </a:xfrm>
+          <a:prstGeom prst="rect">
+            <a:avLst/>
+          </a:prstGeom>
+          <a:noFill/>
+        </p:spPr>
+        <p:txBody>
+          <a:bodyPr wrap="square">
+            <a:spAutoFit/>
+          </a:bodyPr>
+          <a:lstStyle/>
+          <a:p>
+            <a:pPr algn="l">
+              <a:defRPr sz="1400" b="1">
                 <a:solidFill>
                   <a:srgbClr val="E60000"/>
                 </a:solidFill>
@@ -17202,7 +17202,7 @@
         </p:nvSpPr>
         <p:spPr>
           <a:xfrm>
-            <a:off x="6217920" y="2743200"/>
+            <a:off x="6400800" y="2834640"/>
             <a:ext cx="5303520" cy="2743200"/>
           </a:xfrm>
           <a:prstGeom prst="rect">
@@ -17220,7 +17220,7 @@
               <a:spcAft>
                 <a:spcPts val="400"/>
               </a:spcAft>
-              <a:defRPr sz="1000">
+              <a:defRPr sz="1200">
                 <a:solidFill>
                   <a:srgbClr val="333333"/>
                 </a:solidFill>
@@ -17236,7 +17236,7 @@
               <a:spcAft>
                 <a:spcPts val="400"/>
               </a:spcAft>
-              <a:defRPr sz="1000">
+              <a:defRPr sz="1200">
                 <a:solidFill>
                   <a:srgbClr val="333333"/>
                 </a:solidFill>
@@ -17252,7 +17252,7 @@
               <a:spcAft>
                 <a:spcPts val="400"/>
               </a:spcAft>
-              <a:defRPr sz="1000">
+              <a:defRPr sz="1200">
                 <a:solidFill>
                   <a:srgbClr val="333333"/>
                 </a:solidFill>
@@ -17268,7 +17268,7 @@
               <a:spcAft>
                 <a:spcPts val="400"/>
               </a:spcAft>
-              <a:defRPr sz="1000">
+              <a:defRPr sz="1200">
                 <a:solidFill>
                   <a:srgbClr val="333333"/>
                 </a:solidFill>
@@ -18142,21 +18142,21 @@
         <p:spPr>
           <a:xfrm>
             <a:off x="457200" y="2377440"/>
-            <a:ext cx="5486400" cy="274320"/>
-          </a:xfrm>
-          <a:prstGeom prst="rect">
-            <a:avLst/>
-          </a:prstGeom>
-          <a:noFill/>
-        </p:spPr>
-        <p:txBody>
-          <a:bodyPr wrap="square">
-            <a:spAutoFit/>
-          </a:bodyPr>
-          <a:lstStyle/>
-          <a:p>
-            <a:pPr algn="l">
-              <a:defRPr sz="1200" b="1">
+            <a:ext cx="5669280" cy="320040"/>
+          </a:xfrm>
+          <a:prstGeom prst="rect">
+            <a:avLst/>
+          </a:prstGeom>
+          <a:noFill/>
+        </p:spPr>
+        <p:txBody>
+          <a:bodyPr wrap="square">
+            <a:spAutoFit/>
+          </a:bodyPr>
+          <a:lstStyle/>
+          <a:p>
+            <a:pPr algn="l">
+              <a:defRPr sz="1400" b="1">
                 <a:solidFill>
                   <a:srgbClr val="E60000"/>
                 </a:solidFill>
@@ -18177,8 +18177,8 @@
         </p:nvSpPr>
         <p:spPr>
           <a:xfrm>
-            <a:off x="457200" y="2743200"/>
-            <a:ext cx="5486400" cy="2286000"/>
+            <a:off x="457200" y="2834640"/>
+            <a:ext cx="5669280" cy="2743200"/>
           </a:xfrm>
           <a:prstGeom prst="rect">
             <a:avLst/>
@@ -18195,7 +18195,7 @@
               <a:spcAft>
                 <a:spcPts val="400"/>
               </a:spcAft>
-              <a:defRPr sz="1100">
+              <a:defRPr sz="1300">
                 <a:solidFill>
                   <a:srgbClr val="333333"/>
                 </a:solidFill>
@@ -18211,7 +18211,7 @@
               <a:spcAft>
                 <a:spcPts val="400"/>
               </a:spcAft>
-              <a:defRPr sz="1100">
+              <a:defRPr sz="1300">
                 <a:solidFill>
                   <a:srgbClr val="333333"/>
                 </a:solidFill>
@@ -18227,7 +18227,7 @@
               <a:spcAft>
                 <a:spcPts val="400"/>
               </a:spcAft>
-              <a:defRPr sz="1100">
+              <a:defRPr sz="1300">
                 <a:solidFill>
                   <a:srgbClr val="333333"/>
                 </a:solidFill>
@@ -18243,7 +18243,7 @@
               <a:spcAft>
                 <a:spcPts val="400"/>
               </a:spcAft>
-              <a:defRPr sz="1100">
+              <a:defRPr sz="1300">
                 <a:solidFill>
                   <a:srgbClr val="333333"/>
                 </a:solidFill>
@@ -18259,7 +18259,7 @@
               <a:spcAft>
                 <a:spcPts val="400"/>
               </a:spcAft>
-              <a:defRPr sz="1100">
+              <a:defRPr sz="1300">
                 <a:solidFill>
                   <a:srgbClr val="333333"/>
                 </a:solidFill>
@@ -18280,22 +18280,22 @@
         </p:nvSpPr>
         <p:spPr>
           <a:xfrm>
-            <a:off x="6217920" y="2377440"/>
-            <a:ext cx="5303520" cy="274320"/>
-          </a:xfrm>
-          <a:prstGeom prst="rect">
-            <a:avLst/>
-          </a:prstGeom>
-          <a:noFill/>
-        </p:spPr>
-        <p:txBody>
-          <a:bodyPr wrap="square">
-            <a:spAutoFit/>
-          </a:bodyPr>
-          <a:lstStyle/>
-          <a:p>
-            <a:pPr algn="l">
-              <a:defRPr sz="1200" b="1">
+            <a:off x="6400800" y="2377440"/>
+            <a:ext cx="5303520" cy="320040"/>
+          </a:xfrm>
+          <a:prstGeom prst="rect">
+            <a:avLst/>
+          </a:prstGeom>
+          <a:noFill/>
+        </p:spPr>
+        <p:txBody>
+          <a:bodyPr wrap="square">
+            <a:spAutoFit/>
+          </a:bodyPr>
+          <a:lstStyle/>
+          <a:p>
+            <a:pPr algn="l">
+              <a:defRPr sz="1400" b="1">
                 <a:solidFill>
                   <a:srgbClr val="E60000"/>
                 </a:solidFill>
@@ -18316,7 +18316,7 @@
         </p:nvSpPr>
         <p:spPr>
           <a:xfrm>
-            <a:off x="6217920" y="2743200"/>
+            <a:off x="6400800" y="2834640"/>
             <a:ext cx="5303520" cy="2743200"/>
           </a:xfrm>
           <a:prstGeom prst="rect">
@@ -18334,7 +18334,7 @@
               <a:spcAft>
                 <a:spcPts val="400"/>
               </a:spcAft>
-              <a:defRPr sz="1000">
+              <a:defRPr sz="1200">
                 <a:solidFill>
                   <a:srgbClr val="333333"/>
                 </a:solidFill>
@@ -18350,7 +18350,7 @@
               <a:spcAft>
                 <a:spcPts val="400"/>
               </a:spcAft>
-              <a:defRPr sz="1000">
+              <a:defRPr sz="1200">
                 <a:solidFill>
                   <a:srgbClr val="333333"/>
                 </a:solidFill>
@@ -18366,7 +18366,7 @@
               <a:spcAft>
                 <a:spcPts val="400"/>
               </a:spcAft>
-              <a:defRPr sz="1000">
+              <a:defRPr sz="1200">
                 <a:solidFill>
                   <a:srgbClr val="333333"/>
                 </a:solidFill>
@@ -18382,7 +18382,7 @@
               <a:spcAft>
                 <a:spcPts val="400"/>
               </a:spcAft>
-              <a:defRPr sz="1000">
+              <a:defRPr sz="1200">
                 <a:solidFill>
                   <a:srgbClr val="333333"/>
                 </a:solidFill>
@@ -18398,7 +18398,7 @@
               <a:spcAft>
                 <a:spcPts val="400"/>
               </a:spcAft>
-              <a:defRPr sz="1000">
+              <a:defRPr sz="1200">
                 <a:solidFill>
                   <a:srgbClr val="333333"/>
                 </a:solidFill>
@@ -22529,21 +22529,21 @@
         <p:spPr>
           <a:xfrm>
             <a:off x="274320" y="1280160"/>
-            <a:ext cx="3474720" cy="274320"/>
-          </a:xfrm>
-          <a:prstGeom prst="rect">
-            <a:avLst/>
-          </a:prstGeom>
-          <a:noFill/>
-        </p:spPr>
-        <p:txBody>
-          <a:bodyPr wrap="square">
-            <a:spAutoFit/>
-          </a:bodyPr>
-          <a:lstStyle/>
-          <a:p>
-            <a:pPr algn="l">
-              <a:defRPr sz="1300" b="1">
+            <a:ext cx="3657600" cy="320040"/>
+          </a:xfrm>
+          <a:prstGeom prst="rect">
+            <a:avLst/>
+          </a:prstGeom>
+          <a:noFill/>
+        </p:spPr>
+        <p:txBody>
+          <a:bodyPr wrap="square">
+            <a:spAutoFit/>
+          </a:bodyPr>
+          <a:lstStyle/>
+          <a:p>
+            <a:pPr algn="l">
+              <a:defRPr sz="1500" b="1">
                 <a:solidFill>
                   <a:srgbClr val="008000"/>
                 </a:solidFill>
@@ -22564,8 +22564,8 @@
         </p:nvSpPr>
         <p:spPr>
           <a:xfrm>
-            <a:off x="274320" y="1645920"/>
-            <a:ext cx="3474720" cy="3840480"/>
+            <a:off x="274320" y="1737360"/>
+            <a:ext cx="3657600" cy="4114800"/>
           </a:xfrm>
           <a:prstGeom prst="rect">
             <a:avLst/>
@@ -22582,7 +22582,7 @@
               <a:spcAft>
                 <a:spcPts val="400"/>
               </a:spcAft>
-              <a:defRPr sz="1000">
+              <a:defRPr sz="1300">
                 <a:solidFill>
                   <a:srgbClr val="333333"/>
                 </a:solidFill>
@@ -22598,7 +22598,7 @@
               <a:spcAft>
                 <a:spcPts val="400"/>
               </a:spcAft>
-              <a:defRPr sz="1000">
+              <a:defRPr sz="1300">
                 <a:solidFill>
                   <a:srgbClr val="333333"/>
                 </a:solidFill>
@@ -22614,7 +22614,7 @@
               <a:spcAft>
                 <a:spcPts val="400"/>
               </a:spcAft>
-              <a:defRPr sz="1000">
+              <a:defRPr sz="1300">
                 <a:solidFill>
                   <a:srgbClr val="333333"/>
                 </a:solidFill>
@@ -22630,7 +22630,7 @@
               <a:spcAft>
                 <a:spcPts val="400"/>
               </a:spcAft>
-              <a:defRPr sz="1000">
+              <a:defRPr sz="1300">
                 <a:solidFill>
                   <a:srgbClr val="333333"/>
                 </a:solidFill>
@@ -22646,7 +22646,7 @@
               <a:spcAft>
                 <a:spcPts val="400"/>
               </a:spcAft>
-              <a:defRPr sz="1000">
+              <a:defRPr sz="1300">
                 <a:solidFill>
                   <a:srgbClr val="333333"/>
                 </a:solidFill>
@@ -22662,7 +22662,7 @@
               <a:spcAft>
                 <a:spcPts val="400"/>
               </a:spcAft>
-              <a:defRPr sz="1000">
+              <a:defRPr sz="1300">
                 <a:solidFill>
                   <a:srgbClr val="333333"/>
                 </a:solidFill>
@@ -22684,21 +22684,21 @@
         <p:spPr>
           <a:xfrm>
             <a:off x="4114800" y="1280160"/>
-            <a:ext cx="3474720" cy="274320"/>
-          </a:xfrm>
-          <a:prstGeom prst="rect">
-            <a:avLst/>
-          </a:prstGeom>
-          <a:noFill/>
-        </p:spPr>
-        <p:txBody>
-          <a:bodyPr wrap="square">
-            <a:spAutoFit/>
-          </a:bodyPr>
-          <a:lstStyle/>
-          <a:p>
-            <a:pPr algn="l">
-              <a:defRPr sz="1300" b="1">
+            <a:ext cx="3657600" cy="320040"/>
+          </a:xfrm>
+          <a:prstGeom prst="rect">
+            <a:avLst/>
+          </a:prstGeom>
+          <a:noFill/>
+        </p:spPr>
+        <p:txBody>
+          <a:bodyPr wrap="square">
+            <a:spAutoFit/>
+          </a:bodyPr>
+          <a:lstStyle/>
+          <a:p>
+            <a:pPr algn="l">
+              <a:defRPr sz="1500" b="1">
                 <a:solidFill>
                   <a:srgbClr val="C80000"/>
                 </a:solidFill>
@@ -22719,8 +22719,8 @@
         </p:nvSpPr>
         <p:spPr>
           <a:xfrm>
-            <a:off x="4114800" y="1645920"/>
-            <a:ext cx="3474720" cy="3840480"/>
+            <a:off x="4114800" y="1737360"/>
+            <a:ext cx="3657600" cy="4114800"/>
           </a:xfrm>
           <a:prstGeom prst="rect">
             <a:avLst/>
@@ -22737,7 +22737,7 @@
               <a:spcAft>
                 <a:spcPts val="400"/>
               </a:spcAft>
-              <a:defRPr sz="1000">
+              <a:defRPr sz="1300">
                 <a:solidFill>
                   <a:srgbClr val="333333"/>
                 </a:solidFill>
@@ -22753,7 +22753,7 @@
               <a:spcAft>
                 <a:spcPts val="400"/>
               </a:spcAft>
-              <a:defRPr sz="1000">
+              <a:defRPr sz="1300">
                 <a:solidFill>
                   <a:srgbClr val="333333"/>
                 </a:solidFill>
@@ -22769,7 +22769,7 @@
               <a:spcAft>
                 <a:spcPts val="400"/>
               </a:spcAft>
-              <a:defRPr sz="1000">
+              <a:defRPr sz="1300">
                 <a:solidFill>
                   <a:srgbClr val="333333"/>
                 </a:solidFill>
@@ -22785,7 +22785,7 @@
               <a:spcAft>
                 <a:spcPts val="400"/>
               </a:spcAft>
-              <a:defRPr sz="1000">
+              <a:defRPr sz="1300">
                 <a:solidFill>
                   <a:srgbClr val="333333"/>
                 </a:solidFill>
@@ -22801,7 +22801,7 @@
               <a:spcAft>
                 <a:spcPts val="400"/>
               </a:spcAft>
-              <a:defRPr sz="1000">
+              <a:defRPr sz="1300">
                 <a:solidFill>
                   <a:srgbClr val="333333"/>
                 </a:solidFill>
@@ -22817,7 +22817,7 @@
               <a:spcAft>
                 <a:spcPts val="400"/>
               </a:spcAft>
-              <a:defRPr sz="1000">
+              <a:defRPr sz="1300">
                 <a:solidFill>
                   <a:srgbClr val="333333"/>
                 </a:solidFill>
@@ -22839,21 +22839,21 @@
         <p:spPr>
           <a:xfrm>
             <a:off x="7955279" y="1280160"/>
-            <a:ext cx="3474720" cy="274320"/>
-          </a:xfrm>
-          <a:prstGeom prst="rect">
-            <a:avLst/>
-          </a:prstGeom>
-          <a:noFill/>
-        </p:spPr>
-        <p:txBody>
-          <a:bodyPr wrap="square">
-            <a:spAutoFit/>
-          </a:bodyPr>
-          <a:lstStyle/>
-          <a:p>
-            <a:pPr algn="l">
-              <a:defRPr sz="1300" b="1">
+            <a:ext cx="3657600" cy="320040"/>
+          </a:xfrm>
+          <a:prstGeom prst="rect">
+            <a:avLst/>
+          </a:prstGeom>
+          <a:noFill/>
+        </p:spPr>
+        <p:txBody>
+          <a:bodyPr wrap="square">
+            <a:spAutoFit/>
+          </a:bodyPr>
+          <a:lstStyle/>
+          <a:p>
+            <a:pPr algn="l">
+              <a:defRPr sz="1500" b="1">
                 <a:solidFill>
                   <a:srgbClr val="FFA500"/>
                 </a:solidFill>
@@ -22874,8 +22874,8 @@
         </p:nvSpPr>
         <p:spPr>
           <a:xfrm>
-            <a:off x="7955279" y="1645920"/>
-            <a:ext cx="3474720" cy="3840480"/>
+            <a:off x="7955279" y="1737360"/>
+            <a:ext cx="3657600" cy="4114800"/>
           </a:xfrm>
           <a:prstGeom prst="rect">
             <a:avLst/>
@@ -22892,7 +22892,7 @@
               <a:spcAft>
                 <a:spcPts val="400"/>
               </a:spcAft>
-              <a:defRPr sz="1000">
+              <a:defRPr sz="1300">
                 <a:solidFill>
                   <a:srgbClr val="333333"/>
                 </a:solidFill>
@@ -22908,7 +22908,7 @@
               <a:spcAft>
                 <a:spcPts val="400"/>
               </a:spcAft>
-              <a:defRPr sz="1000">
+              <a:defRPr sz="1300">
                 <a:solidFill>
                   <a:srgbClr val="333333"/>
                 </a:solidFill>
@@ -22924,7 +22924,7 @@
               <a:spcAft>
                 <a:spcPts val="400"/>
               </a:spcAft>
-              <a:defRPr sz="1000">
+              <a:defRPr sz="1300">
                 <a:solidFill>
                   <a:srgbClr val="333333"/>
                 </a:solidFill>
@@ -22940,7 +22940,7 @@
               <a:spcAft>
                 <a:spcPts val="400"/>
               </a:spcAft>
-              <a:defRPr sz="1000">
+              <a:defRPr sz="1300">
                 <a:solidFill>
                   <a:srgbClr val="333333"/>
                 </a:solidFill>
@@ -22956,7 +22956,7 @@
               <a:spcAft>
                 <a:spcPts val="400"/>
               </a:spcAft>
-              <a:defRPr sz="1000">
+              <a:defRPr sz="1300">
                 <a:solidFill>
                   <a:srgbClr val="333333"/>
                 </a:solidFill>

</xml_diff>